<commit_message>
Trabajando el capítulo de manual de usuario SIGMUND
</commit_message>
<xml_diff>
--- a/ManFigs/res_pert_sigmund.pptx
+++ b/ManFigs/res_pert_sigmund.pptx
@@ -5,7 +5,7 @@
     <p:sldMasterId id="2147483648" r:id="rId1"/>
   </p:sldMasterIdLst>
   <p:notesMasterIdLst>
-    <p:notesMasterId r:id="rId28"/>
+    <p:notesMasterId r:id="rId29"/>
   </p:notesMasterIdLst>
   <p:sldIdLst>
     <p:sldId id="260" r:id="rId2"/>
@@ -13,27 +13,28 @@
     <p:sldId id="258" r:id="rId4"/>
     <p:sldId id="273" r:id="rId5"/>
     <p:sldId id="263" r:id="rId6"/>
-    <p:sldId id="274" r:id="rId7"/>
-    <p:sldId id="265" r:id="rId8"/>
-    <p:sldId id="275" r:id="rId9"/>
-    <p:sldId id="284" r:id="rId10"/>
-    <p:sldId id="285" r:id="rId11"/>
-    <p:sldId id="286" r:id="rId12"/>
-    <p:sldId id="276" r:id="rId13"/>
-    <p:sldId id="267" r:id="rId14"/>
-    <p:sldId id="277" r:id="rId15"/>
-    <p:sldId id="266" r:id="rId16"/>
-    <p:sldId id="278" r:id="rId17"/>
-    <p:sldId id="268" r:id="rId18"/>
-    <p:sldId id="279" r:id="rId19"/>
-    <p:sldId id="269" r:id="rId20"/>
-    <p:sldId id="280" r:id="rId21"/>
-    <p:sldId id="270" r:id="rId22"/>
-    <p:sldId id="281" r:id="rId23"/>
-    <p:sldId id="271" r:id="rId24"/>
-    <p:sldId id="282" r:id="rId25"/>
-    <p:sldId id="272" r:id="rId26"/>
-    <p:sldId id="283" r:id="rId27"/>
+    <p:sldId id="287" r:id="rId7"/>
+    <p:sldId id="274" r:id="rId8"/>
+    <p:sldId id="265" r:id="rId9"/>
+    <p:sldId id="275" r:id="rId10"/>
+    <p:sldId id="284" r:id="rId11"/>
+    <p:sldId id="285" r:id="rId12"/>
+    <p:sldId id="286" r:id="rId13"/>
+    <p:sldId id="276" r:id="rId14"/>
+    <p:sldId id="267" r:id="rId15"/>
+    <p:sldId id="277" r:id="rId16"/>
+    <p:sldId id="266" r:id="rId17"/>
+    <p:sldId id="278" r:id="rId18"/>
+    <p:sldId id="268" r:id="rId19"/>
+    <p:sldId id="279" r:id="rId20"/>
+    <p:sldId id="269" r:id="rId21"/>
+    <p:sldId id="280" r:id="rId22"/>
+    <p:sldId id="270" r:id="rId23"/>
+    <p:sldId id="281" r:id="rId24"/>
+    <p:sldId id="271" r:id="rId25"/>
+    <p:sldId id="282" r:id="rId26"/>
+    <p:sldId id="272" r:id="rId27"/>
+    <p:sldId id="283" r:id="rId28"/>
   </p:sldIdLst>
   <p:sldSz cx="9144000" cy="6858000" type="screen4x3"/>
   <p:notesSz cx="6858000" cy="9144000"/>
@@ -217,7 +218,7 @@
           <a:p>
             <a:fld id="{C3FDFD3F-90A1-4B55-BA8A-5B5CA979F2CC}" type="datetimeFigureOut">
               <a:rPr lang="es-ES" smtClean="0"/>
-              <a:t>24/05/2016</a:t>
+              <a:t>25/05/2016</a:t>
             </a:fld>
             <a:endParaRPr lang="es-ES"/>
           </a:p>
@@ -750,7 +751,7 @@
           <a:p>
             <a:fld id="{D5FF05AB-935B-4636-AFFA-34DDE2A0F114}" type="datetimeFigureOut">
               <a:rPr lang="es-ES" smtClean="0"/>
-              <a:t>24/05/2016</a:t>
+              <a:t>25/05/2016</a:t>
             </a:fld>
             <a:endParaRPr lang="es-ES"/>
           </a:p>
@@ -920,7 +921,7 @@
           <a:p>
             <a:fld id="{D5FF05AB-935B-4636-AFFA-34DDE2A0F114}" type="datetimeFigureOut">
               <a:rPr lang="es-ES" smtClean="0"/>
-              <a:t>24/05/2016</a:t>
+              <a:t>25/05/2016</a:t>
             </a:fld>
             <a:endParaRPr lang="es-ES"/>
           </a:p>
@@ -1100,7 +1101,7 @@
           <a:p>
             <a:fld id="{D5FF05AB-935B-4636-AFFA-34DDE2A0F114}" type="datetimeFigureOut">
               <a:rPr lang="es-ES" smtClean="0"/>
-              <a:t>24/05/2016</a:t>
+              <a:t>25/05/2016</a:t>
             </a:fld>
             <a:endParaRPr lang="es-ES"/>
           </a:p>
@@ -1270,7 +1271,7 @@
           <a:p>
             <a:fld id="{D5FF05AB-935B-4636-AFFA-34DDE2A0F114}" type="datetimeFigureOut">
               <a:rPr lang="es-ES" smtClean="0"/>
-              <a:t>24/05/2016</a:t>
+              <a:t>25/05/2016</a:t>
             </a:fld>
             <a:endParaRPr lang="es-ES"/>
           </a:p>
@@ -1516,7 +1517,7 @@
           <a:p>
             <a:fld id="{D5FF05AB-935B-4636-AFFA-34DDE2A0F114}" type="datetimeFigureOut">
               <a:rPr lang="es-ES" smtClean="0"/>
-              <a:t>24/05/2016</a:t>
+              <a:t>25/05/2016</a:t>
             </a:fld>
             <a:endParaRPr lang="es-ES"/>
           </a:p>
@@ -1804,7 +1805,7 @@
           <a:p>
             <a:fld id="{D5FF05AB-935B-4636-AFFA-34DDE2A0F114}" type="datetimeFigureOut">
               <a:rPr lang="es-ES" smtClean="0"/>
-              <a:t>24/05/2016</a:t>
+              <a:t>25/05/2016</a:t>
             </a:fld>
             <a:endParaRPr lang="es-ES"/>
           </a:p>
@@ -2226,7 +2227,7 @@
           <a:p>
             <a:fld id="{D5FF05AB-935B-4636-AFFA-34DDE2A0F114}" type="datetimeFigureOut">
               <a:rPr lang="es-ES" smtClean="0"/>
-              <a:t>24/05/2016</a:t>
+              <a:t>25/05/2016</a:t>
             </a:fld>
             <a:endParaRPr lang="es-ES"/>
           </a:p>
@@ -2344,7 +2345,7 @@
           <a:p>
             <a:fld id="{D5FF05AB-935B-4636-AFFA-34DDE2A0F114}" type="datetimeFigureOut">
               <a:rPr lang="es-ES" smtClean="0"/>
-              <a:t>24/05/2016</a:t>
+              <a:t>25/05/2016</a:t>
             </a:fld>
             <a:endParaRPr lang="es-ES"/>
           </a:p>
@@ -2439,7 +2440,7 @@
           <a:p>
             <a:fld id="{D5FF05AB-935B-4636-AFFA-34DDE2A0F114}" type="datetimeFigureOut">
               <a:rPr lang="es-ES" smtClean="0"/>
-              <a:t>24/05/2016</a:t>
+              <a:t>25/05/2016</a:t>
             </a:fld>
             <a:endParaRPr lang="es-ES"/>
           </a:p>
@@ -2716,7 +2717,7 @@
           <a:p>
             <a:fld id="{D5FF05AB-935B-4636-AFFA-34DDE2A0F114}" type="datetimeFigureOut">
               <a:rPr lang="es-ES" smtClean="0"/>
-              <a:t>24/05/2016</a:t>
+              <a:t>25/05/2016</a:t>
             </a:fld>
             <a:endParaRPr lang="es-ES"/>
           </a:p>
@@ -2969,7 +2970,7 @@
           <a:p>
             <a:fld id="{D5FF05AB-935B-4636-AFFA-34DDE2A0F114}" type="datetimeFigureOut">
               <a:rPr lang="es-ES" smtClean="0"/>
-              <a:t>24/05/2016</a:t>
+              <a:t>25/05/2016</a:t>
             </a:fld>
             <a:endParaRPr lang="es-ES"/>
           </a:p>
@@ -3182,7 +3183,7 @@
           <a:p>
             <a:fld id="{D5FF05AB-935B-4636-AFFA-34DDE2A0F114}" type="datetimeFigureOut">
               <a:rPr lang="es-ES" smtClean="0"/>
-              <a:t>24/05/2016</a:t>
+              <a:t>25/05/2016</a:t>
             </a:fld>
             <a:endParaRPr lang="es-ES"/>
           </a:p>
@@ -3876,7 +3877,7 @@
       </p:sp>
       <p:pic>
         <p:nvPicPr>
-          <p:cNvPr id="4098" name="Picture 2"/>
+          <p:cNvPr id="3074" name="Picture 2"/>
           <p:cNvPicPr>
             <a:picLocks noChangeAspect="1" noChangeArrowheads="1"/>
           </p:cNvPicPr>
@@ -3897,8 +3898,8 @@
         </p:blipFill>
         <p:spPr bwMode="auto">
           <a:xfrm>
-            <a:off x="467543" y="2708920"/>
-            <a:ext cx="8513797" cy="3684333"/>
+            <a:off x="221582" y="2564904"/>
+            <a:ext cx="8700835" cy="3712245"/>
           </a:xfrm>
           <a:prstGeom prst="rect">
             <a:avLst/>
@@ -3930,7 +3931,7 @@
       </p:pic>
       <p:pic>
         <p:nvPicPr>
-          <p:cNvPr id="4099" name="Picture 3"/>
+          <p:cNvPr id="3075" name="Picture 3"/>
           <p:cNvPicPr>
             <a:picLocks noChangeAspect="1" noChangeArrowheads="1"/>
           </p:cNvPicPr>
@@ -3951,8 +3952,8 @@
         </p:blipFill>
         <p:spPr bwMode="auto">
           <a:xfrm>
-            <a:off x="890588" y="1412776"/>
-            <a:ext cx="7362825" cy="1123950"/>
+            <a:off x="809624" y="1330580"/>
+            <a:ext cx="7524750" cy="1057275"/>
           </a:xfrm>
           <a:prstGeom prst="rect">
             <a:avLst/>
@@ -3985,7 +3986,7 @@
     </p:spTree>
     <p:extLst>
       <p:ext uri="{BB962C8B-B14F-4D97-AF65-F5344CB8AC3E}">
-        <p14:creationId xmlns:p14="http://schemas.microsoft.com/office/powerpoint/2010/main" val="1053245698"/>
+        <p14:creationId xmlns:p14="http://schemas.microsoft.com/office/powerpoint/2010/main" val="280804745"/>
       </p:ext>
     </p:extLst>
   </p:cSld>
@@ -4064,7 +4065,7 @@
       </p:sp>
       <p:pic>
         <p:nvPicPr>
-          <p:cNvPr id="5124" name="Picture 4"/>
+          <p:cNvPr id="4098" name="Picture 2"/>
           <p:cNvPicPr>
             <a:picLocks noChangeAspect="1" noChangeArrowheads="1"/>
           </p:cNvPicPr>
@@ -4085,8 +4086,8 @@
         </p:blipFill>
         <p:spPr bwMode="auto">
           <a:xfrm>
-            <a:off x="810184" y="1785193"/>
-            <a:ext cx="7439025" cy="695325"/>
+            <a:off x="467543" y="2708920"/>
+            <a:ext cx="8513797" cy="3684333"/>
           </a:xfrm>
           <a:prstGeom prst="rect">
             <a:avLst/>
@@ -4118,7 +4119,7 @@
       </p:pic>
       <p:pic>
         <p:nvPicPr>
-          <p:cNvPr id="5125" name="Picture 5"/>
+          <p:cNvPr id="4099" name="Picture 3"/>
           <p:cNvPicPr>
             <a:picLocks noChangeAspect="1" noChangeArrowheads="1"/>
           </p:cNvPicPr>
@@ -4139,8 +4140,8 @@
         </p:blipFill>
         <p:spPr bwMode="auto">
           <a:xfrm>
-            <a:off x="418943" y="2780928"/>
-            <a:ext cx="7978312" cy="3431449"/>
+            <a:off x="890588" y="1412776"/>
+            <a:ext cx="7362825" cy="1123950"/>
           </a:xfrm>
           <a:prstGeom prst="rect">
             <a:avLst/>
@@ -4173,7 +4174,7 @@
     </p:spTree>
     <p:extLst>
       <p:ext uri="{BB962C8B-B14F-4D97-AF65-F5344CB8AC3E}">
-        <p14:creationId xmlns:p14="http://schemas.microsoft.com/office/powerpoint/2010/main" val="2642849359"/>
+        <p14:creationId xmlns:p14="http://schemas.microsoft.com/office/powerpoint/2010/main" val="1053245698"/>
       </p:ext>
     </p:extLst>
   </p:cSld>
@@ -4207,9 +4208,52 @@
           <a:chExt cx="0" cy="0"/>
         </a:xfrm>
       </p:grpSpPr>
+      <p:sp>
+        <p:nvSpPr>
+          <p:cNvPr id="6" name="5 CuadroTexto"/>
+          <p:cNvSpPr txBox="1"/>
+          <p:nvPr/>
+        </p:nvSpPr>
+        <p:spPr>
+          <a:xfrm>
+            <a:off x="6228184" y="6534834"/>
+            <a:ext cx="3168352" cy="646331"/>
+          </a:xfrm>
+          <a:prstGeom prst="rect">
+            <a:avLst/>
+          </a:prstGeom>
+          <a:noFill/>
+        </p:spPr>
+        <p:txBody>
+          <a:bodyPr wrap="square" rtlCol="0">
+            <a:spAutoFit/>
+          </a:bodyPr>
+          <a:lstStyle/>
+          <a:p>
+            <a:pPr algn="ctr"/>
+            <a:r>
+              <a:rPr lang="es-ES" dirty="0" smtClean="0">
+                <a:solidFill>
+                  <a:schemeClr val="tx2">
+                    <a:lumMod val="75000"/>
+                  </a:schemeClr>
+                </a:solidFill>
+              </a:rPr>
+              <a:t>El crecimiento de todo el sistema se retrasa</a:t>
+            </a:r>
+            <a:endParaRPr lang="es-ES" dirty="0">
+              <a:solidFill>
+                <a:schemeClr val="tx2">
+                  <a:lumMod val="75000"/>
+                </a:schemeClr>
+              </a:solidFill>
+            </a:endParaRPr>
+          </a:p>
+        </p:txBody>
+      </p:sp>
       <p:pic>
         <p:nvPicPr>
-          <p:cNvPr id="3074" name="Picture 2"/>
+          <p:cNvPr id="5124" name="Picture 4"/>
           <p:cNvPicPr>
             <a:picLocks noChangeAspect="1" noChangeArrowheads="1"/>
           </p:cNvPicPr>
@@ -4230,8 +4274,8 @@
         </p:blipFill>
         <p:spPr bwMode="auto">
           <a:xfrm>
-            <a:off x="695325" y="214313"/>
-            <a:ext cx="7753350" cy="6429375"/>
+            <a:off x="810184" y="1785193"/>
+            <a:ext cx="7439025" cy="695325"/>
           </a:xfrm>
           <a:prstGeom prst="rect">
             <a:avLst/>
@@ -4261,10 +4305,64 @@
           </a:extLst>
         </p:spPr>
       </p:pic>
+      <p:pic>
+        <p:nvPicPr>
+          <p:cNvPr id="5125" name="Picture 5"/>
+          <p:cNvPicPr>
+            <a:picLocks noChangeAspect="1" noChangeArrowheads="1"/>
+          </p:cNvPicPr>
+          <p:nvPr/>
+        </p:nvPicPr>
+        <p:blipFill>
+          <a:blip r:embed="rId3">
+            <a:extLst>
+              <a:ext uri="{28A0092B-C50C-407E-A947-70E740481C1C}">
+                <a14:useLocalDpi xmlns:a14="http://schemas.microsoft.com/office/drawing/2010/main" val="0"/>
+              </a:ext>
+            </a:extLst>
+          </a:blip>
+          <a:srcRect/>
+          <a:stretch>
+            <a:fillRect/>
+          </a:stretch>
+        </p:blipFill>
+        <p:spPr bwMode="auto">
+          <a:xfrm>
+            <a:off x="418943" y="2780928"/>
+            <a:ext cx="7978312" cy="3431449"/>
+          </a:xfrm>
+          <a:prstGeom prst="rect">
+            <a:avLst/>
+          </a:prstGeom>
+          <a:noFill/>
+          <a:ln>
+            <a:noFill/>
+          </a:ln>
+          <a:extLst>
+            <a:ext uri="{909E8E84-426E-40DD-AFC4-6F175D3DCCD1}">
+              <a14:hiddenFill xmlns:a14="http://schemas.microsoft.com/office/drawing/2010/main">
+                <a:solidFill>
+                  <a:schemeClr val="accent1"/>
+                </a:solidFill>
+              </a14:hiddenFill>
+            </a:ext>
+            <a:ext uri="{91240B29-F687-4F45-9708-019B960494DF}">
+              <a14:hiddenLine xmlns:a14="http://schemas.microsoft.com/office/drawing/2010/main" w="9525">
+                <a:solidFill>
+                  <a:schemeClr val="tx1"/>
+                </a:solidFill>
+                <a:miter lim="800000"/>
+                <a:headEnd/>
+                <a:tailEnd/>
+              </a14:hiddenLine>
+            </a:ext>
+          </a:extLst>
+        </p:spPr>
+      </p:pic>
     </p:spTree>
     <p:extLst>
       <p:ext uri="{BB962C8B-B14F-4D97-AF65-F5344CB8AC3E}">
-        <p14:creationId xmlns:p14="http://schemas.microsoft.com/office/powerpoint/2010/main" val="2609092584"/>
+        <p14:creationId xmlns:p14="http://schemas.microsoft.com/office/powerpoint/2010/main" val="2642849359"/>
       </p:ext>
     </p:extLst>
   </p:cSld>
@@ -4300,7 +4398,7 @@
       </p:grpSpPr>
       <p:pic>
         <p:nvPicPr>
-          <p:cNvPr id="4098" name="Picture 2"/>
+          <p:cNvPr id="3074" name="Picture 2"/>
           <p:cNvPicPr>
             <a:picLocks noChangeAspect="1" noChangeArrowheads="1"/>
           </p:cNvPicPr>
@@ -4308,16 +4406,6 @@
         </p:nvPicPr>
         <p:blipFill>
           <a:blip r:embed="rId2">
-            <a:clrChange>
-              <a:clrFrom>
-                <a:srgbClr val="FFFFFF"/>
-              </a:clrFrom>
-              <a:clrTo>
-                <a:srgbClr val="FFFFFF">
-                  <a:alpha val="0"/>
-                </a:srgbClr>
-              </a:clrTo>
-            </a:clrChange>
             <a:extLst>
               <a:ext uri="{28A0092B-C50C-407E-A947-70E740481C1C}">
                 <a14:useLocalDpi xmlns:a14="http://schemas.microsoft.com/office/drawing/2010/main" val="0"/>
@@ -4331,8 +4419,8 @@
         </p:blipFill>
         <p:spPr bwMode="auto">
           <a:xfrm>
-            <a:off x="205895" y="1190388"/>
-            <a:ext cx="8606219" cy="5550980"/>
+            <a:off x="695325" y="214313"/>
+            <a:ext cx="7753350" cy="6429375"/>
           </a:xfrm>
           <a:prstGeom prst="rect">
             <a:avLst/>
@@ -4362,186 +4450,10 @@
           </a:extLst>
         </p:spPr>
       </p:pic>
-      <p:sp>
-        <p:nvSpPr>
-          <p:cNvPr id="4" name="3 CuadroTexto"/>
-          <p:cNvSpPr txBox="1"/>
-          <p:nvPr/>
-        </p:nvSpPr>
-        <p:spPr>
-          <a:xfrm>
-            <a:off x="179511" y="332656"/>
-            <a:ext cx="4964731" cy="461665"/>
-          </a:xfrm>
-          <a:prstGeom prst="rect">
-            <a:avLst/>
-          </a:prstGeom>
-          <a:noFill/>
-        </p:spPr>
-        <p:txBody>
-          <a:bodyPr wrap="square" rtlCol="0">
-            <a:spAutoFit/>
-          </a:bodyPr>
-          <a:lstStyle/>
-          <a:p>
-            <a:r>
-              <a:rPr lang="es-ES" sz="2400" b="1" dirty="0" smtClean="0">
-                <a:solidFill>
-                  <a:schemeClr val="accent5">
-                    <a:lumMod val="50000"/>
-                  </a:schemeClr>
-                </a:solidFill>
-              </a:rPr>
-              <a:t>Oscilación gaussiana de la floración</a:t>
-            </a:r>
-            <a:endParaRPr lang="es-ES" sz="2400" b="1" dirty="0">
-              <a:solidFill>
-                <a:schemeClr val="accent5">
-                  <a:lumMod val="50000"/>
-                </a:schemeClr>
-              </a:solidFill>
-            </a:endParaRPr>
-          </a:p>
-        </p:txBody>
-      </p:sp>
-      <p:sp>
-        <p:nvSpPr>
-          <p:cNvPr id="5" name="4 CuadroTexto"/>
-          <p:cNvSpPr txBox="1"/>
-          <p:nvPr/>
-        </p:nvSpPr>
-        <p:spPr>
-          <a:xfrm>
-            <a:off x="5436096" y="378822"/>
-            <a:ext cx="3528393" cy="830997"/>
-          </a:xfrm>
-          <a:prstGeom prst="rect">
-            <a:avLst/>
-          </a:prstGeom>
-          <a:noFill/>
-        </p:spPr>
-        <p:txBody>
-          <a:bodyPr wrap="square" rtlCol="0">
-            <a:spAutoFit/>
-          </a:bodyPr>
-          <a:lstStyle/>
-          <a:p>
-            <a:r>
-              <a:rPr lang="es-ES" sz="1200" i="1" dirty="0" smtClean="0"/>
-              <a:t>Media 0</a:t>
-            </a:r>
-          </a:p>
-          <a:p>
-            <a:r>
-              <a:rPr lang="es-ES" sz="1200" i="1" dirty="0" smtClean="0">
-                <a:solidFill>
-                  <a:srgbClr val="FF0000"/>
-                </a:solidFill>
-              </a:rPr>
-              <a:t>Periodo de coincidencia 20% del año</a:t>
-            </a:r>
-          </a:p>
-          <a:p>
-            <a:r>
-              <a:rPr lang="es-ES" sz="1200" i="1" dirty="0" smtClean="0">
-                <a:latin typeface="Symbol" panose="05050102010706020507" pitchFamily="18" charset="2"/>
-              </a:rPr>
-              <a:t>s</a:t>
-            </a:r>
-            <a:r>
-              <a:rPr lang="es-ES" sz="1200" i="1" dirty="0" smtClean="0"/>
-              <a:t>  0.01%</a:t>
-            </a:r>
-          </a:p>
-          <a:p>
-            <a:r>
-              <a:rPr lang="es-ES" sz="1200" i="1" dirty="0" smtClean="0"/>
-              <a:t>Afecta a todas las plantas</a:t>
-            </a:r>
-            <a:endParaRPr lang="es-ES" sz="1200" i="1" dirty="0"/>
-          </a:p>
-        </p:txBody>
-      </p:sp>
-      <p:sp>
-        <p:nvSpPr>
-          <p:cNvPr id="6" name="5 CuadroTexto"/>
-          <p:cNvSpPr txBox="1"/>
-          <p:nvPr/>
-        </p:nvSpPr>
-        <p:spPr>
-          <a:xfrm>
-            <a:off x="5004048" y="5445224"/>
-            <a:ext cx="3168352" cy="923330"/>
-          </a:xfrm>
-          <a:prstGeom prst="rect">
-            <a:avLst/>
-          </a:prstGeom>
-          <a:noFill/>
-        </p:spPr>
-        <p:txBody>
-          <a:bodyPr wrap="square" rtlCol="0">
-            <a:spAutoFit/>
-          </a:bodyPr>
-          <a:lstStyle/>
-          <a:p>
-            <a:pPr algn="ctr"/>
-            <a:r>
-              <a:rPr lang="es-ES" dirty="0" smtClean="0">
-                <a:solidFill>
-                  <a:schemeClr val="tx2">
-                    <a:lumMod val="75000"/>
-                  </a:schemeClr>
-                </a:solidFill>
-              </a:rPr>
-              <a:t>Al crecer el periodo de coincidencia el sistema es más resistente</a:t>
-            </a:r>
-            <a:endParaRPr lang="es-ES" dirty="0">
-              <a:solidFill>
-                <a:schemeClr val="tx2">
-                  <a:lumMod val="75000"/>
-                </a:schemeClr>
-              </a:solidFill>
-            </a:endParaRPr>
-          </a:p>
-        </p:txBody>
-      </p:sp>
-      <p:cxnSp>
-        <p:nvCxnSpPr>
-          <p:cNvPr id="8" name="7 Conector recto de flecha"/>
-          <p:cNvCxnSpPr/>
-          <p:nvPr/>
-        </p:nvCxnSpPr>
-        <p:spPr>
-          <a:xfrm flipH="1" flipV="1">
-            <a:off x="3635896" y="2492896"/>
-            <a:ext cx="1656184" cy="2952328"/>
-          </a:xfrm>
-          <a:prstGeom prst="straightConnector1">
-            <a:avLst/>
-          </a:prstGeom>
-          <a:ln>
-            <a:tailEnd type="arrow"/>
-          </a:ln>
-        </p:spPr>
-        <p:style>
-          <a:lnRef idx="1">
-            <a:schemeClr val="accent1"/>
-          </a:lnRef>
-          <a:fillRef idx="0">
-            <a:schemeClr val="accent1"/>
-          </a:fillRef>
-          <a:effectRef idx="0">
-            <a:schemeClr val="accent1"/>
-          </a:effectRef>
-          <a:fontRef idx="minor">
-            <a:schemeClr val="tx1"/>
-          </a:fontRef>
-        </p:style>
-      </p:cxnSp>
     </p:spTree>
     <p:extLst>
       <p:ext uri="{BB962C8B-B14F-4D97-AF65-F5344CB8AC3E}">
-        <p14:creationId xmlns:p14="http://schemas.microsoft.com/office/powerpoint/2010/main" val="835083124"/>
+        <p14:creationId xmlns:p14="http://schemas.microsoft.com/office/powerpoint/2010/main" val="2609092584"/>
       </p:ext>
     </p:extLst>
   </p:cSld>
@@ -4585,6 +4497,16 @@
         </p:nvPicPr>
         <p:blipFill>
           <a:blip r:embed="rId2">
+            <a:clrChange>
+              <a:clrFrom>
+                <a:srgbClr val="FFFFFF"/>
+              </a:clrFrom>
+              <a:clrTo>
+                <a:srgbClr val="FFFFFF">
+                  <a:alpha val="0"/>
+                </a:srgbClr>
+              </a:clrTo>
+            </a:clrChange>
             <a:extLst>
               <a:ext uri="{28A0092B-C50C-407E-A947-70E740481C1C}">
                 <a14:useLocalDpi xmlns:a14="http://schemas.microsoft.com/office/drawing/2010/main" val="0"/>
@@ -4598,8 +4520,8 @@
         </p:blipFill>
         <p:spPr bwMode="auto">
           <a:xfrm>
-            <a:off x="695325" y="214313"/>
-            <a:ext cx="7753350" cy="6429375"/>
+            <a:off x="205895" y="1190388"/>
+            <a:ext cx="8606219" cy="5550980"/>
           </a:xfrm>
           <a:prstGeom prst="rect">
             <a:avLst/>
@@ -4629,16 +4551,199 @@
           </a:extLst>
         </p:spPr>
       </p:pic>
+      <p:sp>
+        <p:nvSpPr>
+          <p:cNvPr id="4" name="3 CuadroTexto"/>
+          <p:cNvSpPr txBox="1"/>
+          <p:nvPr/>
+        </p:nvSpPr>
+        <p:spPr>
+          <a:xfrm>
+            <a:off x="179511" y="332656"/>
+            <a:ext cx="4964731" cy="461665"/>
+          </a:xfrm>
+          <a:prstGeom prst="rect">
+            <a:avLst/>
+          </a:prstGeom>
+          <a:noFill/>
+        </p:spPr>
+        <p:txBody>
+          <a:bodyPr wrap="square" rtlCol="0">
+            <a:spAutoFit/>
+          </a:bodyPr>
+          <a:lstStyle/>
+          <a:p>
+            <a:r>
+              <a:rPr lang="es-ES" sz="2400" b="1" dirty="0" smtClean="0">
+                <a:solidFill>
+                  <a:schemeClr val="accent5">
+                    <a:lumMod val="50000"/>
+                  </a:schemeClr>
+                </a:solidFill>
+              </a:rPr>
+              <a:t>Oscilación gaussiana de la floración</a:t>
+            </a:r>
+            <a:endParaRPr lang="es-ES" sz="2400" b="1" dirty="0">
+              <a:solidFill>
+                <a:schemeClr val="accent5">
+                  <a:lumMod val="50000"/>
+                </a:schemeClr>
+              </a:solidFill>
+            </a:endParaRPr>
+          </a:p>
+        </p:txBody>
+      </p:sp>
+      <p:sp>
+        <p:nvSpPr>
+          <p:cNvPr id="5" name="4 CuadroTexto"/>
+          <p:cNvSpPr txBox="1"/>
+          <p:nvPr/>
+        </p:nvSpPr>
+        <p:spPr>
+          <a:xfrm>
+            <a:off x="5436096" y="378822"/>
+            <a:ext cx="3528393" cy="830997"/>
+          </a:xfrm>
+          <a:prstGeom prst="rect">
+            <a:avLst/>
+          </a:prstGeom>
+          <a:noFill/>
+        </p:spPr>
+        <p:txBody>
+          <a:bodyPr wrap="square" rtlCol="0">
+            <a:spAutoFit/>
+          </a:bodyPr>
+          <a:lstStyle/>
+          <a:p>
+            <a:r>
+              <a:rPr lang="es-ES" sz="1200" i="1" dirty="0" smtClean="0"/>
+              <a:t>Media 0</a:t>
+            </a:r>
+          </a:p>
+          <a:p>
+            <a:r>
+              <a:rPr lang="es-ES" sz="1200" i="1" dirty="0" smtClean="0">
+                <a:solidFill>
+                  <a:srgbClr val="FF0000"/>
+                </a:solidFill>
+              </a:rPr>
+              <a:t>Periodo de coincidencia 20% del año</a:t>
+            </a:r>
+          </a:p>
+          <a:p>
+            <a:r>
+              <a:rPr lang="es-ES" sz="1200" i="1" dirty="0" smtClean="0">
+                <a:latin typeface="Symbol" panose="05050102010706020507" pitchFamily="18" charset="2"/>
+              </a:rPr>
+              <a:t>s</a:t>
+            </a:r>
+            <a:r>
+              <a:rPr lang="es-ES" sz="1200" i="1" dirty="0" smtClean="0"/>
+              <a:t>  0.01%</a:t>
+            </a:r>
+          </a:p>
+          <a:p>
+            <a:r>
+              <a:rPr lang="es-ES" sz="1200" i="1" dirty="0" smtClean="0"/>
+              <a:t>Afecta a todas las plantas</a:t>
+            </a:r>
+            <a:endParaRPr lang="es-ES" sz="1200" i="1" dirty="0"/>
+          </a:p>
+        </p:txBody>
+      </p:sp>
+      <p:sp>
+        <p:nvSpPr>
+          <p:cNvPr id="6" name="5 CuadroTexto"/>
+          <p:cNvSpPr txBox="1"/>
+          <p:nvPr/>
+        </p:nvSpPr>
+        <p:spPr>
+          <a:xfrm>
+            <a:off x="5004048" y="5445224"/>
+            <a:ext cx="3168352" cy="923330"/>
+          </a:xfrm>
+          <a:prstGeom prst="rect">
+            <a:avLst/>
+          </a:prstGeom>
+          <a:noFill/>
+        </p:spPr>
+        <p:txBody>
+          <a:bodyPr wrap="square" rtlCol="0">
+            <a:spAutoFit/>
+          </a:bodyPr>
+          <a:lstStyle/>
+          <a:p>
+            <a:pPr algn="ctr"/>
+            <a:r>
+              <a:rPr lang="es-ES" dirty="0" smtClean="0">
+                <a:solidFill>
+                  <a:schemeClr val="tx2">
+                    <a:lumMod val="75000"/>
+                  </a:schemeClr>
+                </a:solidFill>
+              </a:rPr>
+              <a:t>Al crecer el periodo de coincidencia el sistema es más resistente</a:t>
+            </a:r>
+            <a:endParaRPr lang="es-ES" dirty="0">
+              <a:solidFill>
+                <a:schemeClr val="tx2">
+                  <a:lumMod val="75000"/>
+                </a:schemeClr>
+              </a:solidFill>
+            </a:endParaRPr>
+          </a:p>
+        </p:txBody>
+      </p:sp>
+      <p:cxnSp>
+        <p:nvCxnSpPr>
+          <p:cNvPr id="8" name="7 Conector recto de flecha"/>
+          <p:cNvCxnSpPr/>
+          <p:nvPr/>
+        </p:nvCxnSpPr>
+        <p:spPr>
+          <a:xfrm flipH="1" flipV="1">
+            <a:off x="3635896" y="2492896"/>
+            <a:ext cx="1656184" cy="2952328"/>
+          </a:xfrm>
+          <a:prstGeom prst="straightConnector1">
+            <a:avLst/>
+          </a:prstGeom>
+          <a:ln>
+            <a:tailEnd type="arrow"/>
+          </a:ln>
+        </p:spPr>
+        <p:style>
+          <a:lnRef idx="1">
+            <a:schemeClr val="accent1"/>
+          </a:lnRef>
+          <a:fillRef idx="0">
+            <a:schemeClr val="accent1"/>
+          </a:fillRef>
+          <a:effectRef idx="0">
+            <a:schemeClr val="accent1"/>
+          </a:effectRef>
+          <a:fontRef idx="minor">
+            <a:schemeClr val="tx1"/>
+          </a:fontRef>
+        </p:style>
+      </p:cxnSp>
     </p:spTree>
     <p:extLst>
       <p:ext uri="{BB962C8B-B14F-4D97-AF65-F5344CB8AC3E}">
-        <p14:creationId xmlns:p14="http://schemas.microsoft.com/office/powerpoint/2010/main" val="1688540766"/>
+        <p14:creationId xmlns:p14="http://schemas.microsoft.com/office/powerpoint/2010/main" val="835083124"/>
       </p:ext>
     </p:extLst>
   </p:cSld>
   <p:clrMapOvr>
     <a:masterClrMapping/>
   </p:clrMapOvr>
+  <p:timing>
+    <p:tnLst>
+      <p:par>
+        <p:cTn id="1" dur="indefinite" restart="never" nodeType="tmRoot"/>
+      </p:par>
+    </p:tnLst>
+  </p:timing>
 </p:sld>
 </file>
 
@@ -4661,7 +4766,7 @@
       </p:grpSpPr>
       <p:pic>
         <p:nvPicPr>
-          <p:cNvPr id="5122" name="Picture 2"/>
+          <p:cNvPr id="4098" name="Picture 2"/>
           <p:cNvPicPr>
             <a:picLocks noChangeAspect="1" noChangeArrowheads="1"/>
           </p:cNvPicPr>
@@ -4669,16 +4774,6 @@
         </p:nvPicPr>
         <p:blipFill>
           <a:blip r:embed="rId2">
-            <a:clrChange>
-              <a:clrFrom>
-                <a:srgbClr val="FFFFFF"/>
-              </a:clrFrom>
-              <a:clrTo>
-                <a:srgbClr val="FFFFFF">
-                  <a:alpha val="0"/>
-                </a:srgbClr>
-              </a:clrTo>
-            </a:clrChange>
             <a:extLst>
               <a:ext uri="{28A0092B-C50C-407E-A947-70E740481C1C}">
                 <a14:useLocalDpi xmlns:a14="http://schemas.microsoft.com/office/drawing/2010/main" val="0"/>
@@ -4692,8 +4787,8 @@
         </p:blipFill>
         <p:spPr bwMode="auto">
           <a:xfrm>
-            <a:off x="253911" y="1412777"/>
-            <a:ext cx="8206521" cy="5360468"/>
+            <a:off x="695325" y="214313"/>
+            <a:ext cx="7753350" cy="6429375"/>
           </a:xfrm>
           <a:prstGeom prst="rect">
             <a:avLst/>
@@ -4723,135 +4818,16 @@
           </a:extLst>
         </p:spPr>
       </p:pic>
-      <p:sp>
-        <p:nvSpPr>
-          <p:cNvPr id="4" name="3 CuadroTexto"/>
-          <p:cNvSpPr txBox="1"/>
-          <p:nvPr/>
-        </p:nvSpPr>
-        <p:spPr>
-          <a:xfrm>
-            <a:off x="179511" y="332656"/>
-            <a:ext cx="4964731" cy="461665"/>
-          </a:xfrm>
-          <a:prstGeom prst="rect">
-            <a:avLst/>
-          </a:prstGeom>
-          <a:noFill/>
-        </p:spPr>
-        <p:txBody>
-          <a:bodyPr wrap="square" rtlCol="0">
-            <a:spAutoFit/>
-          </a:bodyPr>
-          <a:lstStyle/>
-          <a:p>
-            <a:r>
-              <a:rPr lang="es-ES" sz="2400" b="1" dirty="0" smtClean="0">
-                <a:solidFill>
-                  <a:schemeClr val="accent5">
-                    <a:lumMod val="50000"/>
-                  </a:schemeClr>
-                </a:solidFill>
-              </a:rPr>
-              <a:t>Oscilación gaussiana creciente</a:t>
-            </a:r>
-            <a:endParaRPr lang="es-ES" sz="2400" b="1" dirty="0">
-              <a:solidFill>
-                <a:schemeClr val="accent5">
-                  <a:lumMod val="50000"/>
-                </a:schemeClr>
-              </a:solidFill>
-            </a:endParaRPr>
-          </a:p>
-        </p:txBody>
-      </p:sp>
-      <p:sp>
-        <p:nvSpPr>
-          <p:cNvPr id="5" name="4 CuadroTexto"/>
-          <p:cNvSpPr txBox="1"/>
-          <p:nvPr/>
-        </p:nvSpPr>
-        <p:spPr>
-          <a:xfrm>
-            <a:off x="5144242" y="378822"/>
-            <a:ext cx="3820247" cy="1015663"/>
-          </a:xfrm>
-          <a:prstGeom prst="rect">
-            <a:avLst/>
-          </a:prstGeom>
-          <a:noFill/>
-        </p:spPr>
-        <p:txBody>
-          <a:bodyPr wrap="square" rtlCol="0">
-            <a:spAutoFit/>
-          </a:bodyPr>
-          <a:lstStyle/>
-          <a:p>
-            <a:r>
-              <a:rPr lang="es-ES" sz="1200" i="1" dirty="0" smtClean="0"/>
-              <a:t>Media 0</a:t>
-            </a:r>
-          </a:p>
-          <a:p>
-            <a:r>
-              <a:rPr lang="es-ES" sz="1200" i="1" dirty="0" smtClean="0"/>
-              <a:t>Periodo de coincidencia 10% del año</a:t>
-            </a:r>
-          </a:p>
-          <a:p>
-            <a:pPr marL="171450" indent="-171450">
-              <a:buFont typeface="Symbol"/>
-              <a:buChar char="s"/>
-            </a:pPr>
-            <a:r>
-              <a:rPr lang="es-ES" sz="1200" i="1" dirty="0" smtClean="0"/>
-              <a:t>0.005 % (1 + </a:t>
-            </a:r>
-            <a:r>
-              <a:rPr lang="es-ES" sz="1200" i="1" dirty="0" err="1" smtClean="0"/>
-              <a:t>pendientre</a:t>
-            </a:r>
-            <a:r>
-              <a:rPr lang="es-ES" sz="1200" i="1" dirty="0" smtClean="0"/>
-              <a:t> * x)   x = tiempo/tiempo total</a:t>
-            </a:r>
-          </a:p>
-          <a:p>
-            <a:r>
-              <a:rPr lang="es-ES" sz="1200" i="1" dirty="0" err="1" smtClean="0"/>
-              <a:t>Pendirente</a:t>
-            </a:r>
-            <a:r>
-              <a:rPr lang="es-ES" sz="1200" i="1" dirty="0" smtClean="0"/>
-              <a:t> = 3</a:t>
-            </a:r>
-          </a:p>
-          <a:p>
-            <a:r>
-              <a:rPr lang="es-ES" sz="1200" i="1" dirty="0" smtClean="0"/>
-              <a:t>Afecta a todas las plantas</a:t>
-            </a:r>
-            <a:endParaRPr lang="es-ES" sz="1200" i="1" dirty="0"/>
-          </a:p>
-        </p:txBody>
-      </p:sp>
     </p:spTree>
     <p:extLst>
       <p:ext uri="{BB962C8B-B14F-4D97-AF65-F5344CB8AC3E}">
-        <p14:creationId xmlns:p14="http://schemas.microsoft.com/office/powerpoint/2010/main" val="858432876"/>
+        <p14:creationId xmlns:p14="http://schemas.microsoft.com/office/powerpoint/2010/main" val="1688540766"/>
       </p:ext>
     </p:extLst>
   </p:cSld>
   <p:clrMapOvr>
     <a:masterClrMapping/>
   </p:clrMapOvr>
-  <p:timing>
-    <p:tnLst>
-      <p:par>
-        <p:cTn id="1" dur="indefinite" restart="never" nodeType="tmRoot"/>
-      </p:par>
-    </p:tnLst>
-  </p:timing>
 </p:sld>
 </file>
 
@@ -4882,6 +4858,219 @@
         </p:nvPicPr>
         <p:blipFill>
           <a:blip r:embed="rId2">
+            <a:clrChange>
+              <a:clrFrom>
+                <a:srgbClr val="FFFFFF"/>
+              </a:clrFrom>
+              <a:clrTo>
+                <a:srgbClr val="FFFFFF">
+                  <a:alpha val="0"/>
+                </a:srgbClr>
+              </a:clrTo>
+            </a:clrChange>
+            <a:extLst>
+              <a:ext uri="{28A0092B-C50C-407E-A947-70E740481C1C}">
+                <a14:useLocalDpi xmlns:a14="http://schemas.microsoft.com/office/drawing/2010/main" val="0"/>
+              </a:ext>
+            </a:extLst>
+          </a:blip>
+          <a:srcRect/>
+          <a:stretch>
+            <a:fillRect/>
+          </a:stretch>
+        </p:blipFill>
+        <p:spPr bwMode="auto">
+          <a:xfrm>
+            <a:off x="253911" y="1412777"/>
+            <a:ext cx="8206521" cy="5360468"/>
+          </a:xfrm>
+          <a:prstGeom prst="rect">
+            <a:avLst/>
+          </a:prstGeom>
+          <a:noFill/>
+          <a:ln>
+            <a:noFill/>
+          </a:ln>
+          <a:extLst>
+            <a:ext uri="{909E8E84-426E-40DD-AFC4-6F175D3DCCD1}">
+              <a14:hiddenFill xmlns:a14="http://schemas.microsoft.com/office/drawing/2010/main">
+                <a:solidFill>
+                  <a:schemeClr val="accent1"/>
+                </a:solidFill>
+              </a14:hiddenFill>
+            </a:ext>
+            <a:ext uri="{91240B29-F687-4F45-9708-019B960494DF}">
+              <a14:hiddenLine xmlns:a14="http://schemas.microsoft.com/office/drawing/2010/main" w="9525">
+                <a:solidFill>
+                  <a:schemeClr val="tx1"/>
+                </a:solidFill>
+                <a:miter lim="800000"/>
+                <a:headEnd/>
+                <a:tailEnd/>
+              </a14:hiddenLine>
+            </a:ext>
+          </a:extLst>
+        </p:spPr>
+      </p:pic>
+      <p:sp>
+        <p:nvSpPr>
+          <p:cNvPr id="4" name="3 CuadroTexto"/>
+          <p:cNvSpPr txBox="1"/>
+          <p:nvPr/>
+        </p:nvSpPr>
+        <p:spPr>
+          <a:xfrm>
+            <a:off x="179511" y="332656"/>
+            <a:ext cx="4964731" cy="461665"/>
+          </a:xfrm>
+          <a:prstGeom prst="rect">
+            <a:avLst/>
+          </a:prstGeom>
+          <a:noFill/>
+        </p:spPr>
+        <p:txBody>
+          <a:bodyPr wrap="square" rtlCol="0">
+            <a:spAutoFit/>
+          </a:bodyPr>
+          <a:lstStyle/>
+          <a:p>
+            <a:r>
+              <a:rPr lang="es-ES" sz="2400" b="1" dirty="0" smtClean="0">
+                <a:solidFill>
+                  <a:schemeClr val="accent5">
+                    <a:lumMod val="50000"/>
+                  </a:schemeClr>
+                </a:solidFill>
+              </a:rPr>
+              <a:t>Oscilación gaussiana creciente</a:t>
+            </a:r>
+            <a:endParaRPr lang="es-ES" sz="2400" b="1" dirty="0">
+              <a:solidFill>
+                <a:schemeClr val="accent5">
+                  <a:lumMod val="50000"/>
+                </a:schemeClr>
+              </a:solidFill>
+            </a:endParaRPr>
+          </a:p>
+        </p:txBody>
+      </p:sp>
+      <p:sp>
+        <p:nvSpPr>
+          <p:cNvPr id="5" name="4 CuadroTexto"/>
+          <p:cNvSpPr txBox="1"/>
+          <p:nvPr/>
+        </p:nvSpPr>
+        <p:spPr>
+          <a:xfrm>
+            <a:off x="5144242" y="378822"/>
+            <a:ext cx="3820247" cy="1015663"/>
+          </a:xfrm>
+          <a:prstGeom prst="rect">
+            <a:avLst/>
+          </a:prstGeom>
+          <a:noFill/>
+        </p:spPr>
+        <p:txBody>
+          <a:bodyPr wrap="square" rtlCol="0">
+            <a:spAutoFit/>
+          </a:bodyPr>
+          <a:lstStyle/>
+          <a:p>
+            <a:r>
+              <a:rPr lang="es-ES" sz="1200" i="1" dirty="0" smtClean="0"/>
+              <a:t>Media 0</a:t>
+            </a:r>
+          </a:p>
+          <a:p>
+            <a:r>
+              <a:rPr lang="es-ES" sz="1200" i="1" dirty="0" smtClean="0"/>
+              <a:t>Periodo de coincidencia 10% del año</a:t>
+            </a:r>
+          </a:p>
+          <a:p>
+            <a:pPr marL="171450" indent="-171450">
+              <a:buFont typeface="Symbol"/>
+              <a:buChar char="s"/>
+            </a:pPr>
+            <a:r>
+              <a:rPr lang="es-ES" sz="1200" i="1" dirty="0" smtClean="0"/>
+              <a:t>0.005 % (1 + </a:t>
+            </a:r>
+            <a:r>
+              <a:rPr lang="es-ES" sz="1200" i="1" dirty="0" err="1" smtClean="0"/>
+              <a:t>pendientre</a:t>
+            </a:r>
+            <a:r>
+              <a:rPr lang="es-ES" sz="1200" i="1" dirty="0" smtClean="0"/>
+              <a:t> * x)   x = tiempo/tiempo total</a:t>
+            </a:r>
+          </a:p>
+          <a:p>
+            <a:r>
+              <a:rPr lang="es-ES" sz="1200" i="1" dirty="0" err="1" smtClean="0"/>
+              <a:t>Pendirente</a:t>
+            </a:r>
+            <a:r>
+              <a:rPr lang="es-ES" sz="1200" i="1" dirty="0" smtClean="0"/>
+              <a:t> = 3</a:t>
+            </a:r>
+          </a:p>
+          <a:p>
+            <a:r>
+              <a:rPr lang="es-ES" sz="1200" i="1" dirty="0" smtClean="0"/>
+              <a:t>Afecta a todas las plantas</a:t>
+            </a:r>
+            <a:endParaRPr lang="es-ES" sz="1200" i="1" dirty="0"/>
+          </a:p>
+        </p:txBody>
+      </p:sp>
+    </p:spTree>
+    <p:extLst>
+      <p:ext uri="{BB962C8B-B14F-4D97-AF65-F5344CB8AC3E}">
+        <p14:creationId xmlns:p14="http://schemas.microsoft.com/office/powerpoint/2010/main" val="858432876"/>
+      </p:ext>
+    </p:extLst>
+  </p:cSld>
+  <p:clrMapOvr>
+    <a:masterClrMapping/>
+  </p:clrMapOvr>
+  <p:timing>
+    <p:tnLst>
+      <p:par>
+        <p:cTn id="1" dur="indefinite" restart="never" nodeType="tmRoot"/>
+      </p:par>
+    </p:tnLst>
+  </p:timing>
+</p:sld>
+</file>
+
+<file path=ppt/slides/slide17.xml><?xml version="1.0" encoding="utf-8"?>
+<p:sld xmlns:a="http://schemas.openxmlformats.org/drawingml/2006/main" xmlns:r="http://schemas.openxmlformats.org/officeDocument/2006/relationships" xmlns:p="http://schemas.openxmlformats.org/presentationml/2006/main">
+  <p:cSld>
+    <p:spTree>
+      <p:nvGrpSpPr>
+        <p:cNvPr id="1" name=""/>
+        <p:cNvGrpSpPr/>
+        <p:nvPr/>
+      </p:nvGrpSpPr>
+      <p:grpSpPr>
+        <a:xfrm>
+          <a:off x="0" y="0"/>
+          <a:ext cx="0" cy="0"/>
+          <a:chOff x="0" y="0"/>
+          <a:chExt cx="0" cy="0"/>
+        </a:xfrm>
+      </p:grpSpPr>
+      <p:pic>
+        <p:nvPicPr>
+          <p:cNvPr id="5122" name="Picture 2"/>
+          <p:cNvPicPr>
+            <a:picLocks noChangeAspect="1" noChangeArrowheads="1"/>
+          </p:cNvPicPr>
+          <p:nvPr/>
+        </p:nvPicPr>
+        <p:blipFill>
+          <a:blip r:embed="rId2">
             <a:extLst>
               <a:ext uri="{28A0092B-C50C-407E-A947-70E740481C1C}">
                 <a14:useLocalDpi xmlns:a14="http://schemas.microsoft.com/office/drawing/2010/main" val="0"/>
@@ -4939,7 +5128,7 @@
 </p:sld>
 </file>
 
-<file path=ppt/slides/slide17.xml><?xml version="1.0" encoding="utf-8"?>
+<file path=ppt/slides/slide18.xml><?xml version="1.0" encoding="utf-8"?>
 <p:sld xmlns:a="http://schemas.openxmlformats.org/drawingml/2006/main" xmlns:r="http://schemas.openxmlformats.org/officeDocument/2006/relationships" xmlns:p="http://schemas.openxmlformats.org/presentationml/2006/main">
   <p:cSld>
     <p:spTree>
@@ -5180,90 +5369,6 @@
       </p:par>
     </p:tnLst>
   </p:timing>
-</p:sld>
-</file>
-
-<file path=ppt/slides/slide18.xml><?xml version="1.0" encoding="utf-8"?>
-<p:sld xmlns:a="http://schemas.openxmlformats.org/drawingml/2006/main" xmlns:r="http://schemas.openxmlformats.org/officeDocument/2006/relationships" xmlns:p="http://schemas.openxmlformats.org/presentationml/2006/main">
-  <p:cSld>
-    <p:spTree>
-      <p:nvGrpSpPr>
-        <p:cNvPr id="1" name=""/>
-        <p:cNvGrpSpPr/>
-        <p:nvPr/>
-      </p:nvGrpSpPr>
-      <p:grpSpPr>
-        <a:xfrm>
-          <a:off x="0" y="0"/>
-          <a:ext cx="0" cy="0"/>
-          <a:chOff x="0" y="0"/>
-          <a:chExt cx="0" cy="0"/>
-        </a:xfrm>
-      </p:grpSpPr>
-      <p:pic>
-        <p:nvPicPr>
-          <p:cNvPr id="7170" name="Picture 2"/>
-          <p:cNvPicPr>
-            <a:picLocks noChangeAspect="1" noChangeArrowheads="1"/>
-          </p:cNvPicPr>
-          <p:nvPr/>
-        </p:nvPicPr>
-        <p:blipFill>
-          <a:blip r:embed="rId2">
-            <a:extLst>
-              <a:ext uri="{28A0092B-C50C-407E-A947-70E740481C1C}">
-                <a14:useLocalDpi xmlns:a14="http://schemas.microsoft.com/office/drawing/2010/main" val="0"/>
-              </a:ext>
-            </a:extLst>
-          </a:blip>
-          <a:srcRect/>
-          <a:stretch>
-            <a:fillRect/>
-          </a:stretch>
-        </p:blipFill>
-        <p:spPr bwMode="auto">
-          <a:xfrm>
-            <a:off x="695325" y="214313"/>
-            <a:ext cx="7753350" cy="6429375"/>
-          </a:xfrm>
-          <a:prstGeom prst="rect">
-            <a:avLst/>
-          </a:prstGeom>
-          <a:noFill/>
-          <a:ln>
-            <a:noFill/>
-          </a:ln>
-          <a:extLst>
-            <a:ext uri="{909E8E84-426E-40DD-AFC4-6F175D3DCCD1}">
-              <a14:hiddenFill xmlns:a14="http://schemas.microsoft.com/office/drawing/2010/main">
-                <a:solidFill>
-                  <a:schemeClr val="accent1"/>
-                </a:solidFill>
-              </a14:hiddenFill>
-            </a:ext>
-            <a:ext uri="{91240B29-F687-4F45-9708-019B960494DF}">
-              <a14:hiddenLine xmlns:a14="http://schemas.microsoft.com/office/drawing/2010/main" w="9525">
-                <a:solidFill>
-                  <a:schemeClr val="tx1"/>
-                </a:solidFill>
-                <a:miter lim="800000"/>
-                <a:headEnd/>
-                <a:tailEnd/>
-              </a14:hiddenLine>
-            </a:ext>
-          </a:extLst>
-        </p:spPr>
-      </p:pic>
-    </p:spTree>
-    <p:extLst>
-      <p:ext uri="{BB962C8B-B14F-4D97-AF65-F5344CB8AC3E}">
-        <p14:creationId xmlns:p14="http://schemas.microsoft.com/office/powerpoint/2010/main" val="371983809"/>
-      </p:ext>
-    </p:extLst>
-  </p:cSld>
-  <p:clrMapOvr>
-    <a:masterClrMapping/>
-  </p:clrMapOvr>
 </p:sld>
 </file>
 
@@ -5294,16 +5399,6 @@
         </p:nvPicPr>
         <p:blipFill>
           <a:blip r:embed="rId2">
-            <a:clrChange>
-              <a:clrFrom>
-                <a:srgbClr val="FFFFFF"/>
-              </a:clrFrom>
-              <a:clrTo>
-                <a:srgbClr val="FFFFFF">
-                  <a:alpha val="0"/>
-                </a:srgbClr>
-              </a:clrTo>
-            </a:clrChange>
             <a:extLst>
               <a:ext uri="{28A0092B-C50C-407E-A947-70E740481C1C}">
                 <a14:useLocalDpi xmlns:a14="http://schemas.microsoft.com/office/drawing/2010/main" val="0"/>
@@ -5317,8 +5412,8 @@
         </p:blipFill>
         <p:spPr bwMode="auto">
           <a:xfrm>
-            <a:off x="534252" y="1556792"/>
-            <a:ext cx="7976580" cy="5190361"/>
+            <a:off x="695325" y="214313"/>
+            <a:ext cx="7753350" cy="6429375"/>
           </a:xfrm>
           <a:prstGeom prst="rect">
             <a:avLst/>
@@ -5348,170 +5443,16 @@
           </a:extLst>
         </p:spPr>
       </p:pic>
-      <p:sp>
-        <p:nvSpPr>
-          <p:cNvPr id="4" name="3 CuadroTexto"/>
-          <p:cNvSpPr txBox="1"/>
-          <p:nvPr/>
-        </p:nvSpPr>
-        <p:spPr>
-          <a:xfrm>
-            <a:off x="179511" y="332656"/>
-            <a:ext cx="4964731" cy="461665"/>
-          </a:xfrm>
-          <a:prstGeom prst="rect">
-            <a:avLst/>
-          </a:prstGeom>
-          <a:noFill/>
-        </p:spPr>
-        <p:txBody>
-          <a:bodyPr wrap="square" rtlCol="0">
-            <a:spAutoFit/>
-          </a:bodyPr>
-          <a:lstStyle/>
-          <a:p>
-            <a:r>
-              <a:rPr lang="es-ES" sz="2400" b="1" dirty="0" smtClean="0">
-                <a:solidFill>
-                  <a:schemeClr val="accent5">
-                    <a:lumMod val="50000"/>
-                  </a:schemeClr>
-                </a:solidFill>
-              </a:rPr>
-              <a:t>Oscilación gaussiana cíclica</a:t>
-            </a:r>
-            <a:endParaRPr lang="es-ES" sz="2400" b="1" dirty="0">
-              <a:solidFill>
-                <a:schemeClr val="accent5">
-                  <a:lumMod val="50000"/>
-                </a:schemeClr>
-              </a:solidFill>
-            </a:endParaRPr>
-          </a:p>
-        </p:txBody>
-      </p:sp>
-      <p:sp>
-        <p:nvSpPr>
-          <p:cNvPr id="5" name="4 CuadroTexto"/>
-          <p:cNvSpPr txBox="1"/>
-          <p:nvPr/>
-        </p:nvSpPr>
-        <p:spPr>
-          <a:xfrm>
-            <a:off x="5436096" y="378822"/>
-            <a:ext cx="3528393" cy="1015663"/>
-          </a:xfrm>
-          <a:prstGeom prst="rect">
-            <a:avLst/>
-          </a:prstGeom>
-          <a:noFill/>
-        </p:spPr>
-        <p:txBody>
-          <a:bodyPr wrap="square" rtlCol="0">
-            <a:spAutoFit/>
-          </a:bodyPr>
-          <a:lstStyle/>
-          <a:p>
-            <a:r>
-              <a:rPr lang="es-ES" sz="1200" i="1" dirty="0" smtClean="0"/>
-              <a:t>Media 0</a:t>
-            </a:r>
-          </a:p>
-          <a:p>
-            <a:r>
-              <a:rPr lang="es-ES" sz="1200" i="1" dirty="0" smtClean="0"/>
-              <a:t>Periodo de coincidencia 10% del año</a:t>
-            </a:r>
-          </a:p>
-          <a:p>
-            <a:pPr marL="171450" indent="-171450">
-              <a:buFont typeface="Symbol"/>
-              <a:buChar char="s"/>
-            </a:pPr>
-            <a:r>
-              <a:rPr lang="es-ES" sz="1200" i="1" dirty="0" smtClean="0">
-                <a:solidFill>
-                  <a:srgbClr val="FF0000"/>
-                </a:solidFill>
-              </a:rPr>
-              <a:t>0.015%</a:t>
-            </a:r>
-          </a:p>
-          <a:p>
-            <a:r>
-              <a:rPr lang="es-ES" sz="1200" i="1" dirty="0" smtClean="0"/>
-              <a:t>Periodo de la oscilación 10 años</a:t>
-            </a:r>
-          </a:p>
-          <a:p>
-            <a:r>
-              <a:rPr lang="es-ES" sz="1200" i="1" dirty="0" smtClean="0"/>
-              <a:t>Afecta a todas las plantas</a:t>
-            </a:r>
-            <a:endParaRPr lang="es-ES" sz="1200" i="1" dirty="0"/>
-          </a:p>
-        </p:txBody>
-      </p:sp>
-      <p:sp>
-        <p:nvSpPr>
-          <p:cNvPr id="6" name="5 CuadroTexto"/>
-          <p:cNvSpPr txBox="1"/>
-          <p:nvPr/>
-        </p:nvSpPr>
-        <p:spPr>
-          <a:xfrm>
-            <a:off x="5004048" y="5445224"/>
-            <a:ext cx="3168352" cy="646331"/>
-          </a:xfrm>
-          <a:prstGeom prst="rect">
-            <a:avLst/>
-          </a:prstGeom>
-          <a:noFill/>
-        </p:spPr>
-        <p:txBody>
-          <a:bodyPr wrap="square" rtlCol="0">
-            <a:spAutoFit/>
-          </a:bodyPr>
-          <a:lstStyle/>
-          <a:p>
-            <a:pPr algn="ctr"/>
-            <a:r>
-              <a:rPr lang="es-ES" dirty="0" smtClean="0">
-                <a:solidFill>
-                  <a:schemeClr val="tx2">
-                    <a:lumMod val="75000"/>
-                  </a:schemeClr>
-                </a:solidFill>
-              </a:rPr>
-              <a:t>En este caso el sistema se destruye</a:t>
-            </a:r>
-            <a:endParaRPr lang="es-ES" dirty="0">
-              <a:solidFill>
-                <a:schemeClr val="tx2">
-                  <a:lumMod val="75000"/>
-                </a:schemeClr>
-              </a:solidFill>
-            </a:endParaRPr>
-          </a:p>
-        </p:txBody>
-      </p:sp>
     </p:spTree>
     <p:extLst>
       <p:ext uri="{BB962C8B-B14F-4D97-AF65-F5344CB8AC3E}">
-        <p14:creationId xmlns:p14="http://schemas.microsoft.com/office/powerpoint/2010/main" val="2860120354"/>
+        <p14:creationId xmlns:p14="http://schemas.microsoft.com/office/powerpoint/2010/main" val="371983809"/>
       </p:ext>
     </p:extLst>
   </p:cSld>
   <p:clrMapOvr>
     <a:masterClrMapping/>
   </p:clrMapOvr>
-  <p:timing>
-    <p:tnLst>
-      <p:par>
-        <p:cTn id="1" dur="indefinite" restart="never" nodeType="tmRoot"/>
-      </p:par>
-    </p:tnLst>
-  </p:timing>
 </p:sld>
 </file>
 
@@ -8333,133 +8274,7 @@
       </p:grpSpPr>
       <p:pic>
         <p:nvPicPr>
-          <p:cNvPr id="8194" name="Picture 2"/>
-          <p:cNvPicPr>
-            <a:picLocks noChangeAspect="1" noChangeArrowheads="1"/>
-          </p:cNvPicPr>
-          <p:nvPr/>
-        </p:nvPicPr>
-        <p:blipFill>
-          <a:blip r:embed="rId2">
-            <a:extLst>
-              <a:ext uri="{28A0092B-C50C-407E-A947-70E740481C1C}">
-                <a14:useLocalDpi xmlns:a14="http://schemas.microsoft.com/office/drawing/2010/main" val="0"/>
-              </a:ext>
-            </a:extLst>
-          </a:blip>
-          <a:srcRect/>
-          <a:stretch>
-            <a:fillRect/>
-          </a:stretch>
-        </p:blipFill>
-        <p:spPr bwMode="auto">
-          <a:xfrm>
-            <a:off x="695325" y="214313"/>
-            <a:ext cx="7753350" cy="6429375"/>
-          </a:xfrm>
-          <a:prstGeom prst="rect">
-            <a:avLst/>
-          </a:prstGeom>
-          <a:noFill/>
-          <a:ln>
-            <a:noFill/>
-          </a:ln>
-          <a:extLst>
-            <a:ext uri="{909E8E84-426E-40DD-AFC4-6F175D3DCCD1}">
-              <a14:hiddenFill xmlns:a14="http://schemas.microsoft.com/office/drawing/2010/main">
-                <a:solidFill>
-                  <a:schemeClr val="accent1"/>
-                </a:solidFill>
-              </a14:hiddenFill>
-            </a:ext>
-            <a:ext uri="{91240B29-F687-4F45-9708-019B960494DF}">
-              <a14:hiddenLine xmlns:a14="http://schemas.microsoft.com/office/drawing/2010/main" w="9525">
-                <a:solidFill>
-                  <a:schemeClr val="tx1"/>
-                </a:solidFill>
-                <a:miter lim="800000"/>
-                <a:headEnd/>
-                <a:tailEnd/>
-              </a14:hiddenLine>
-            </a:ext>
-          </a:extLst>
-        </p:spPr>
-      </p:pic>
-    </p:spTree>
-    <p:extLst>
-      <p:ext uri="{BB962C8B-B14F-4D97-AF65-F5344CB8AC3E}">
-        <p14:creationId xmlns:p14="http://schemas.microsoft.com/office/powerpoint/2010/main" val="3940335928"/>
-      </p:ext>
-    </p:extLst>
-  </p:cSld>
-  <p:clrMapOvr>
-    <a:masterClrMapping/>
-  </p:clrMapOvr>
-</p:sld>
-</file>
-
-<file path=ppt/slides/slide21.xml><?xml version="1.0" encoding="utf-8"?>
-<p:sld xmlns:a="http://schemas.openxmlformats.org/drawingml/2006/main" xmlns:r="http://schemas.openxmlformats.org/officeDocument/2006/relationships" xmlns:p="http://schemas.openxmlformats.org/presentationml/2006/main">
-  <p:cSld>
-    <p:spTree>
-      <p:nvGrpSpPr>
-        <p:cNvPr id="1" name=""/>
-        <p:cNvGrpSpPr/>
-        <p:nvPr/>
-      </p:nvGrpSpPr>
-      <p:grpSpPr>
-        <a:xfrm>
-          <a:off x="0" y="0"/>
-          <a:ext cx="0" cy="0"/>
-          <a:chOff x="0" y="0"/>
-          <a:chExt cx="0" cy="0"/>
-        </a:xfrm>
-      </p:grpSpPr>
-      <p:sp>
-        <p:nvSpPr>
-          <p:cNvPr id="4" name="3 CuadroTexto"/>
-          <p:cNvSpPr txBox="1"/>
-          <p:nvPr/>
-        </p:nvSpPr>
-        <p:spPr>
-          <a:xfrm>
-            <a:off x="179511" y="332656"/>
-            <a:ext cx="4964731" cy="461665"/>
-          </a:xfrm>
-          <a:prstGeom prst="rect">
-            <a:avLst/>
-          </a:prstGeom>
-          <a:noFill/>
-        </p:spPr>
-        <p:txBody>
-          <a:bodyPr wrap="square" rtlCol="0">
-            <a:spAutoFit/>
-          </a:bodyPr>
-          <a:lstStyle/>
-          <a:p>
-            <a:r>
-              <a:rPr lang="es-ES" sz="2400" b="1" dirty="0" smtClean="0">
-                <a:solidFill>
-                  <a:schemeClr val="accent5">
-                    <a:lumMod val="50000"/>
-                  </a:schemeClr>
-                </a:solidFill>
-              </a:rPr>
-              <a:t>Red en máximos de inicio</a:t>
-            </a:r>
-            <a:endParaRPr lang="es-ES" sz="2400" b="1" dirty="0">
-              <a:solidFill>
-                <a:schemeClr val="accent5">
-                  <a:lumMod val="50000"/>
-                </a:schemeClr>
-              </a:solidFill>
-            </a:endParaRPr>
-          </a:p>
-        </p:txBody>
-      </p:sp>
-      <p:pic>
-        <p:nvPicPr>
-          <p:cNvPr id="8194" name="Picture 2"/>
+          <p:cNvPr id="7170" name="Picture 2"/>
           <p:cNvPicPr>
             <a:picLocks noChangeAspect="1" noChangeArrowheads="1"/>
           </p:cNvPicPr>
@@ -8490,8 +8305,8 @@
         </p:blipFill>
         <p:spPr bwMode="auto">
           <a:xfrm>
-            <a:off x="179511" y="1196752"/>
-            <a:ext cx="8669084" cy="5588699"/>
+            <a:off x="534252" y="1556792"/>
+            <a:ext cx="7976580" cy="5190361"/>
           </a:xfrm>
           <a:prstGeom prst="rect">
             <a:avLst/>
@@ -8523,14 +8338,14 @@
       </p:pic>
       <p:sp>
         <p:nvSpPr>
-          <p:cNvPr id="6" name="5 CuadroTexto"/>
+          <p:cNvPr id="4" name="3 CuadroTexto"/>
           <p:cNvSpPr txBox="1"/>
           <p:nvPr/>
         </p:nvSpPr>
         <p:spPr>
           <a:xfrm>
-            <a:off x="5436096" y="378822"/>
-            <a:ext cx="3528393" cy="830997"/>
+            <a:off x="179511" y="332656"/>
+            <a:ext cx="4964731" cy="461665"/>
           </a:xfrm>
           <a:prstGeom prst="rect">
             <a:avLst/>
@@ -8544,47 +8359,35 @@
           <a:lstStyle/>
           <a:p>
             <a:r>
-              <a:rPr lang="es-ES" sz="1200" i="1" dirty="0" smtClean="0"/>
-              <a:t>Oscilación gaussiana, media 0</a:t>
-            </a:r>
-          </a:p>
-          <a:p>
-            <a:r>
-              <a:rPr lang="es-ES" sz="1200" i="1" dirty="0" smtClean="0"/>
-              <a:t>Periodo de coincidencia 10% del año</a:t>
-            </a:r>
-          </a:p>
-          <a:p>
-            <a:r>
-              <a:rPr lang="es-ES" sz="1200" i="1" dirty="0" smtClean="0">
-                <a:latin typeface="Symbol" panose="05050102010706020507" pitchFamily="18" charset="2"/>
+              <a:rPr lang="es-ES" sz="2400" b="1" dirty="0" smtClean="0">
+                <a:solidFill>
+                  <a:schemeClr val="accent5">
+                    <a:lumMod val="50000"/>
+                  </a:schemeClr>
+                </a:solidFill>
               </a:rPr>
-              <a:t>s</a:t>
-            </a:r>
-            <a:r>
-              <a:rPr lang="es-ES" sz="1200" i="1" dirty="0" smtClean="0"/>
-              <a:t>  0.01%</a:t>
-            </a:r>
-          </a:p>
-          <a:p>
-            <a:r>
-              <a:rPr lang="es-ES" sz="1200" i="1" dirty="0" smtClean="0"/>
-              <a:t>Afecta a todas las plantas</a:t>
-            </a:r>
-            <a:endParaRPr lang="es-ES" sz="1200" i="1" dirty="0"/>
-          </a:p>
-        </p:txBody>
-      </p:sp>
-      <p:sp>
-        <p:nvSpPr>
-          <p:cNvPr id="7" name="6 CuadroTexto"/>
+              <a:t>Oscilación gaussiana cíclica</a:t>
+            </a:r>
+            <a:endParaRPr lang="es-ES" sz="2400" b="1" dirty="0">
+              <a:solidFill>
+                <a:schemeClr val="accent5">
+                  <a:lumMod val="50000"/>
+                </a:schemeClr>
+              </a:solidFill>
+            </a:endParaRPr>
+          </a:p>
+        </p:txBody>
+      </p:sp>
+      <p:sp>
+        <p:nvSpPr>
+          <p:cNvPr id="5" name="4 CuadroTexto"/>
           <p:cNvSpPr txBox="1"/>
           <p:nvPr/>
         </p:nvSpPr>
         <p:spPr>
           <a:xfrm>
-            <a:off x="5004048" y="5445224"/>
-            <a:ext cx="3168352" cy="369332"/>
+            <a:off x="5436096" y="378822"/>
+            <a:ext cx="3528393" cy="1015663"/>
           </a:xfrm>
           <a:prstGeom prst="rect">
             <a:avLst/>
@@ -8597,6 +8400,68 @@
           </a:bodyPr>
           <a:lstStyle/>
           <a:p>
+            <a:r>
+              <a:rPr lang="es-ES" sz="1200" i="1" dirty="0" smtClean="0"/>
+              <a:t>Media 0</a:t>
+            </a:r>
+          </a:p>
+          <a:p>
+            <a:r>
+              <a:rPr lang="es-ES" sz="1200" i="1" dirty="0" smtClean="0"/>
+              <a:t>Periodo de coincidencia 10% del año</a:t>
+            </a:r>
+          </a:p>
+          <a:p>
+            <a:pPr marL="171450" indent="-171450">
+              <a:buFont typeface="Symbol"/>
+              <a:buChar char="s"/>
+            </a:pPr>
+            <a:r>
+              <a:rPr lang="es-ES" sz="1200" i="1" dirty="0" smtClean="0">
+                <a:solidFill>
+                  <a:srgbClr val="FF0000"/>
+                </a:solidFill>
+              </a:rPr>
+              <a:t>0.015%</a:t>
+            </a:r>
+          </a:p>
+          <a:p>
+            <a:r>
+              <a:rPr lang="es-ES" sz="1200" i="1" dirty="0" smtClean="0"/>
+              <a:t>Periodo de la oscilación 10 años</a:t>
+            </a:r>
+          </a:p>
+          <a:p>
+            <a:r>
+              <a:rPr lang="es-ES" sz="1200" i="1" dirty="0" smtClean="0"/>
+              <a:t>Afecta a todas las plantas</a:t>
+            </a:r>
+            <a:endParaRPr lang="es-ES" sz="1200" i="1" dirty="0"/>
+          </a:p>
+        </p:txBody>
+      </p:sp>
+      <p:sp>
+        <p:nvSpPr>
+          <p:cNvPr id="6" name="5 CuadroTexto"/>
+          <p:cNvSpPr txBox="1"/>
+          <p:nvPr/>
+        </p:nvSpPr>
+        <p:spPr>
+          <a:xfrm>
+            <a:off x="5004048" y="5445224"/>
+            <a:ext cx="3168352" cy="646331"/>
+          </a:xfrm>
+          <a:prstGeom prst="rect">
+            <a:avLst/>
+          </a:prstGeom>
+          <a:noFill/>
+        </p:spPr>
+        <p:txBody>
+          <a:bodyPr wrap="square" rtlCol="0">
+            <a:spAutoFit/>
+          </a:bodyPr>
+          <a:lstStyle/>
+          <a:p>
             <a:pPr algn="ctr"/>
             <a:r>
               <a:rPr lang="es-ES" dirty="0" smtClean="0">
@@ -8606,7 +8471,7 @@
                   </a:schemeClr>
                 </a:solidFill>
               </a:rPr>
-              <a:t>El sistema resiste</a:t>
+              <a:t>En este caso el sistema se destruye</a:t>
             </a:r>
             <a:endParaRPr lang="es-ES" dirty="0">
               <a:solidFill>
@@ -8621,7 +8486,7 @@
     </p:spTree>
     <p:extLst>
       <p:ext uri="{BB962C8B-B14F-4D97-AF65-F5344CB8AC3E}">
-        <p14:creationId xmlns:p14="http://schemas.microsoft.com/office/powerpoint/2010/main" val="857636686"/>
+        <p14:creationId xmlns:p14="http://schemas.microsoft.com/office/powerpoint/2010/main" val="2860120354"/>
       </p:ext>
     </p:extLst>
   </p:cSld>
@@ -8635,6 +8500,90 @@
       </p:par>
     </p:tnLst>
   </p:timing>
+</p:sld>
+</file>
+
+<file path=ppt/slides/slide21.xml><?xml version="1.0" encoding="utf-8"?>
+<p:sld xmlns:a="http://schemas.openxmlformats.org/drawingml/2006/main" xmlns:r="http://schemas.openxmlformats.org/officeDocument/2006/relationships" xmlns:p="http://schemas.openxmlformats.org/presentationml/2006/main">
+  <p:cSld>
+    <p:spTree>
+      <p:nvGrpSpPr>
+        <p:cNvPr id="1" name=""/>
+        <p:cNvGrpSpPr/>
+        <p:nvPr/>
+      </p:nvGrpSpPr>
+      <p:grpSpPr>
+        <a:xfrm>
+          <a:off x="0" y="0"/>
+          <a:ext cx="0" cy="0"/>
+          <a:chOff x="0" y="0"/>
+          <a:chExt cx="0" cy="0"/>
+        </a:xfrm>
+      </p:grpSpPr>
+      <p:pic>
+        <p:nvPicPr>
+          <p:cNvPr id="8194" name="Picture 2"/>
+          <p:cNvPicPr>
+            <a:picLocks noChangeAspect="1" noChangeArrowheads="1"/>
+          </p:cNvPicPr>
+          <p:nvPr/>
+        </p:nvPicPr>
+        <p:blipFill>
+          <a:blip r:embed="rId2">
+            <a:extLst>
+              <a:ext uri="{28A0092B-C50C-407E-A947-70E740481C1C}">
+                <a14:useLocalDpi xmlns:a14="http://schemas.microsoft.com/office/drawing/2010/main" val="0"/>
+              </a:ext>
+            </a:extLst>
+          </a:blip>
+          <a:srcRect/>
+          <a:stretch>
+            <a:fillRect/>
+          </a:stretch>
+        </p:blipFill>
+        <p:spPr bwMode="auto">
+          <a:xfrm>
+            <a:off x="695325" y="214313"/>
+            <a:ext cx="7753350" cy="6429375"/>
+          </a:xfrm>
+          <a:prstGeom prst="rect">
+            <a:avLst/>
+          </a:prstGeom>
+          <a:noFill/>
+          <a:ln>
+            <a:noFill/>
+          </a:ln>
+          <a:extLst>
+            <a:ext uri="{909E8E84-426E-40DD-AFC4-6F175D3DCCD1}">
+              <a14:hiddenFill xmlns:a14="http://schemas.microsoft.com/office/drawing/2010/main">
+                <a:solidFill>
+                  <a:schemeClr val="accent1"/>
+                </a:solidFill>
+              </a14:hiddenFill>
+            </a:ext>
+            <a:ext uri="{91240B29-F687-4F45-9708-019B960494DF}">
+              <a14:hiddenLine xmlns:a14="http://schemas.microsoft.com/office/drawing/2010/main" w="9525">
+                <a:solidFill>
+                  <a:schemeClr val="tx1"/>
+                </a:solidFill>
+                <a:miter lim="800000"/>
+                <a:headEnd/>
+                <a:tailEnd/>
+              </a14:hiddenLine>
+            </a:ext>
+          </a:extLst>
+        </p:spPr>
+      </p:pic>
+    </p:spTree>
+    <p:extLst>
+      <p:ext uri="{BB962C8B-B14F-4D97-AF65-F5344CB8AC3E}">
+        <p14:creationId xmlns:p14="http://schemas.microsoft.com/office/powerpoint/2010/main" val="3940335928"/>
+      </p:ext>
+    </p:extLst>
+  </p:cSld>
+  <p:clrMapOvr>
+    <a:masterClrMapping/>
+  </p:clrMapOvr>
 </p:sld>
 </file>
 
@@ -8655,9 +8604,51 @@
           <a:chExt cx="0" cy="0"/>
         </a:xfrm>
       </p:grpSpPr>
+      <p:sp>
+        <p:nvSpPr>
+          <p:cNvPr id="4" name="3 CuadroTexto"/>
+          <p:cNvSpPr txBox="1"/>
+          <p:nvPr/>
+        </p:nvSpPr>
+        <p:spPr>
+          <a:xfrm>
+            <a:off x="179511" y="332656"/>
+            <a:ext cx="4964731" cy="461665"/>
+          </a:xfrm>
+          <a:prstGeom prst="rect">
+            <a:avLst/>
+          </a:prstGeom>
+          <a:noFill/>
+        </p:spPr>
+        <p:txBody>
+          <a:bodyPr wrap="square" rtlCol="0">
+            <a:spAutoFit/>
+          </a:bodyPr>
+          <a:lstStyle/>
+          <a:p>
+            <a:r>
+              <a:rPr lang="es-ES" sz="2400" b="1" dirty="0" smtClean="0">
+                <a:solidFill>
+                  <a:schemeClr val="accent5">
+                    <a:lumMod val="50000"/>
+                  </a:schemeClr>
+                </a:solidFill>
+              </a:rPr>
+              <a:t>Red en máximos de inicio</a:t>
+            </a:r>
+            <a:endParaRPr lang="es-ES" sz="2400" b="1" dirty="0">
+              <a:solidFill>
+                <a:schemeClr val="accent5">
+                  <a:lumMod val="50000"/>
+                </a:schemeClr>
+              </a:solidFill>
+            </a:endParaRPr>
+          </a:p>
+        </p:txBody>
+      </p:sp>
       <p:pic>
         <p:nvPicPr>
-          <p:cNvPr id="9218" name="Picture 2"/>
+          <p:cNvPr id="8194" name="Picture 2"/>
           <p:cNvPicPr>
             <a:picLocks noChangeAspect="1" noChangeArrowheads="1"/>
           </p:cNvPicPr>
@@ -8665,6 +8656,16 @@
         </p:nvPicPr>
         <p:blipFill>
           <a:blip r:embed="rId2">
+            <a:clrChange>
+              <a:clrFrom>
+                <a:srgbClr val="FFFFFF"/>
+              </a:clrFrom>
+              <a:clrTo>
+                <a:srgbClr val="FFFFFF">
+                  <a:alpha val="0"/>
+                </a:srgbClr>
+              </a:clrTo>
+            </a:clrChange>
             <a:extLst>
               <a:ext uri="{28A0092B-C50C-407E-A947-70E740481C1C}">
                 <a14:useLocalDpi xmlns:a14="http://schemas.microsoft.com/office/drawing/2010/main" val="0"/>
@@ -8678,8 +8679,8 @@
         </p:blipFill>
         <p:spPr bwMode="auto">
           <a:xfrm>
-            <a:off x="695325" y="214313"/>
-            <a:ext cx="7753350" cy="6429375"/>
+            <a:off x="179511" y="1196752"/>
+            <a:ext cx="8669084" cy="5588699"/>
           </a:xfrm>
           <a:prstGeom prst="rect">
             <a:avLst/>
@@ -8709,16 +8710,120 @@
           </a:extLst>
         </p:spPr>
       </p:pic>
+      <p:sp>
+        <p:nvSpPr>
+          <p:cNvPr id="6" name="5 CuadroTexto"/>
+          <p:cNvSpPr txBox="1"/>
+          <p:nvPr/>
+        </p:nvSpPr>
+        <p:spPr>
+          <a:xfrm>
+            <a:off x="5436096" y="378822"/>
+            <a:ext cx="3528393" cy="830997"/>
+          </a:xfrm>
+          <a:prstGeom prst="rect">
+            <a:avLst/>
+          </a:prstGeom>
+          <a:noFill/>
+        </p:spPr>
+        <p:txBody>
+          <a:bodyPr wrap="square" rtlCol="0">
+            <a:spAutoFit/>
+          </a:bodyPr>
+          <a:lstStyle/>
+          <a:p>
+            <a:r>
+              <a:rPr lang="es-ES" sz="1200" i="1" dirty="0" smtClean="0"/>
+              <a:t>Oscilación gaussiana, media 0</a:t>
+            </a:r>
+          </a:p>
+          <a:p>
+            <a:r>
+              <a:rPr lang="es-ES" sz="1200" i="1" dirty="0" smtClean="0"/>
+              <a:t>Periodo de coincidencia 10% del año</a:t>
+            </a:r>
+          </a:p>
+          <a:p>
+            <a:r>
+              <a:rPr lang="es-ES" sz="1200" i="1" dirty="0" smtClean="0">
+                <a:latin typeface="Symbol" panose="05050102010706020507" pitchFamily="18" charset="2"/>
+              </a:rPr>
+              <a:t>s</a:t>
+            </a:r>
+            <a:r>
+              <a:rPr lang="es-ES" sz="1200" i="1" dirty="0" smtClean="0"/>
+              <a:t>  0.01%</a:t>
+            </a:r>
+          </a:p>
+          <a:p>
+            <a:r>
+              <a:rPr lang="es-ES" sz="1200" i="1" dirty="0" smtClean="0"/>
+              <a:t>Afecta a todas las plantas</a:t>
+            </a:r>
+            <a:endParaRPr lang="es-ES" sz="1200" i="1" dirty="0"/>
+          </a:p>
+        </p:txBody>
+      </p:sp>
+      <p:sp>
+        <p:nvSpPr>
+          <p:cNvPr id="7" name="6 CuadroTexto"/>
+          <p:cNvSpPr txBox="1"/>
+          <p:nvPr/>
+        </p:nvSpPr>
+        <p:spPr>
+          <a:xfrm>
+            <a:off x="5004048" y="5445224"/>
+            <a:ext cx="3168352" cy="369332"/>
+          </a:xfrm>
+          <a:prstGeom prst="rect">
+            <a:avLst/>
+          </a:prstGeom>
+          <a:noFill/>
+        </p:spPr>
+        <p:txBody>
+          <a:bodyPr wrap="square" rtlCol="0">
+            <a:spAutoFit/>
+          </a:bodyPr>
+          <a:lstStyle/>
+          <a:p>
+            <a:pPr algn="ctr"/>
+            <a:r>
+              <a:rPr lang="es-ES" dirty="0" smtClean="0">
+                <a:solidFill>
+                  <a:schemeClr val="tx2">
+                    <a:lumMod val="75000"/>
+                  </a:schemeClr>
+                </a:solidFill>
+              </a:rPr>
+              <a:t>El sistema resiste</a:t>
+            </a:r>
+            <a:endParaRPr lang="es-ES" dirty="0">
+              <a:solidFill>
+                <a:schemeClr val="tx2">
+                  <a:lumMod val="75000"/>
+                </a:schemeClr>
+              </a:solidFill>
+            </a:endParaRPr>
+          </a:p>
+        </p:txBody>
+      </p:sp>
     </p:spTree>
     <p:extLst>
       <p:ext uri="{BB962C8B-B14F-4D97-AF65-F5344CB8AC3E}">
-        <p14:creationId xmlns:p14="http://schemas.microsoft.com/office/powerpoint/2010/main" val="4181330675"/>
+        <p14:creationId xmlns:p14="http://schemas.microsoft.com/office/powerpoint/2010/main" val="857636686"/>
       </p:ext>
     </p:extLst>
   </p:cSld>
   <p:clrMapOvr>
     <a:masterClrMapping/>
   </p:clrMapOvr>
+  <p:timing>
+    <p:tnLst>
+      <p:par>
+        <p:cTn id="1" dur="indefinite" restart="never" nodeType="tmRoot"/>
+      </p:par>
+    </p:tnLst>
+  </p:timing>
 </p:sld>
 </file>
 
@@ -8749,6 +8854,90 @@
         </p:nvPicPr>
         <p:blipFill>
           <a:blip r:embed="rId2">
+            <a:extLst>
+              <a:ext uri="{28A0092B-C50C-407E-A947-70E740481C1C}">
+                <a14:useLocalDpi xmlns:a14="http://schemas.microsoft.com/office/drawing/2010/main" val="0"/>
+              </a:ext>
+            </a:extLst>
+          </a:blip>
+          <a:srcRect/>
+          <a:stretch>
+            <a:fillRect/>
+          </a:stretch>
+        </p:blipFill>
+        <p:spPr bwMode="auto">
+          <a:xfrm>
+            <a:off x="695325" y="214313"/>
+            <a:ext cx="7753350" cy="6429375"/>
+          </a:xfrm>
+          <a:prstGeom prst="rect">
+            <a:avLst/>
+          </a:prstGeom>
+          <a:noFill/>
+          <a:ln>
+            <a:noFill/>
+          </a:ln>
+          <a:extLst>
+            <a:ext uri="{909E8E84-426E-40DD-AFC4-6F175D3DCCD1}">
+              <a14:hiddenFill xmlns:a14="http://schemas.microsoft.com/office/drawing/2010/main">
+                <a:solidFill>
+                  <a:schemeClr val="accent1"/>
+                </a:solidFill>
+              </a14:hiddenFill>
+            </a:ext>
+            <a:ext uri="{91240B29-F687-4F45-9708-019B960494DF}">
+              <a14:hiddenLine xmlns:a14="http://schemas.microsoft.com/office/drawing/2010/main" w="9525">
+                <a:solidFill>
+                  <a:schemeClr val="tx1"/>
+                </a:solidFill>
+                <a:miter lim="800000"/>
+                <a:headEnd/>
+                <a:tailEnd/>
+              </a14:hiddenLine>
+            </a:ext>
+          </a:extLst>
+        </p:spPr>
+      </p:pic>
+    </p:spTree>
+    <p:extLst>
+      <p:ext uri="{BB962C8B-B14F-4D97-AF65-F5344CB8AC3E}">
+        <p14:creationId xmlns:p14="http://schemas.microsoft.com/office/powerpoint/2010/main" val="4181330675"/>
+      </p:ext>
+    </p:extLst>
+  </p:cSld>
+  <p:clrMapOvr>
+    <a:masterClrMapping/>
+  </p:clrMapOvr>
+</p:sld>
+</file>
+
+<file path=ppt/slides/slide24.xml><?xml version="1.0" encoding="utf-8"?>
+<p:sld xmlns:a="http://schemas.openxmlformats.org/drawingml/2006/main" xmlns:r="http://schemas.openxmlformats.org/officeDocument/2006/relationships" xmlns:p="http://schemas.openxmlformats.org/presentationml/2006/main">
+  <p:cSld>
+    <p:spTree>
+      <p:nvGrpSpPr>
+        <p:cNvPr id="1" name=""/>
+        <p:cNvGrpSpPr/>
+        <p:nvPr/>
+      </p:nvGrpSpPr>
+      <p:grpSpPr>
+        <a:xfrm>
+          <a:off x="0" y="0"/>
+          <a:ext cx="0" cy="0"/>
+          <a:chOff x="0" y="0"/>
+          <a:chExt cx="0" cy="0"/>
+        </a:xfrm>
+      </p:grpSpPr>
+      <p:pic>
+        <p:nvPicPr>
+          <p:cNvPr id="9218" name="Picture 2"/>
+          <p:cNvPicPr>
+            <a:picLocks noChangeAspect="1" noChangeArrowheads="1"/>
+          </p:cNvPicPr>
+          <p:nvPr/>
+        </p:nvPicPr>
+        <p:blipFill>
+          <a:blip r:embed="rId2">
             <a:clrChange>
               <a:clrFrom>
                 <a:srgbClr val="FFFFFF"/>
@@ -8962,7 +9151,7 @@
 </p:sld>
 </file>
 
-<file path=ppt/slides/slide24.xml><?xml version="1.0" encoding="utf-8"?>
+<file path=ppt/slides/slide25.xml><?xml version="1.0" encoding="utf-8"?>
 <p:sld xmlns:a="http://schemas.openxmlformats.org/drawingml/2006/main" xmlns:r="http://schemas.openxmlformats.org/officeDocument/2006/relationships" xmlns:p="http://schemas.openxmlformats.org/presentationml/2006/main">
   <p:cSld>
     <p:bg>
@@ -9056,7 +9245,7 @@
 </p:sld>
 </file>
 
-<file path=ppt/slides/slide25.xml><?xml version="1.0" encoding="utf-8"?>
+<file path=ppt/slides/slide26.xml><?xml version="1.0" encoding="utf-8"?>
 <p:sld xmlns:a="http://schemas.openxmlformats.org/drawingml/2006/main" xmlns:r="http://schemas.openxmlformats.org/officeDocument/2006/relationships" xmlns:p="http://schemas.openxmlformats.org/presentationml/2006/main">
   <p:cSld>
     <p:bg>
@@ -9306,7 +9495,7 @@
 </p:sld>
 </file>
 
-<file path=ppt/slides/slide26.xml><?xml version="1.0" encoding="utf-8"?>
+<file path=ppt/slides/slide27.xml><?xml version="1.0" encoding="utf-8"?>
 <p:sld xmlns:a="http://schemas.openxmlformats.org/drawingml/2006/main" xmlns:r="http://schemas.openxmlformats.org/officeDocument/2006/relationships" xmlns:p="http://schemas.openxmlformats.org/presentationml/2006/main">
   <p:cSld>
     <p:bg>
@@ -10792,51 +10981,9 @@
           <a:chExt cx="0" cy="0"/>
         </a:xfrm>
       </p:grpSpPr>
-      <p:sp>
-        <p:nvSpPr>
-          <p:cNvPr id="4" name="3 CuadroTexto"/>
-          <p:cNvSpPr txBox="1"/>
-          <p:nvPr/>
-        </p:nvSpPr>
-        <p:spPr>
-          <a:xfrm>
-            <a:off x="179511" y="332656"/>
-            <a:ext cx="4964731" cy="461665"/>
-          </a:xfrm>
-          <a:prstGeom prst="rect">
-            <a:avLst/>
-          </a:prstGeom>
-          <a:noFill/>
-        </p:spPr>
-        <p:txBody>
-          <a:bodyPr wrap="square" rtlCol="0">
-            <a:spAutoFit/>
-          </a:bodyPr>
-          <a:lstStyle/>
-          <a:p>
-            <a:r>
-              <a:rPr lang="es-ES" sz="2400" b="1" dirty="0" smtClean="0">
-                <a:solidFill>
-                  <a:schemeClr val="accent5">
-                    <a:lumMod val="50000"/>
-                  </a:schemeClr>
-                </a:solidFill>
-              </a:rPr>
-              <a:t>Red del experimento</a:t>
-            </a:r>
-            <a:endParaRPr lang="es-ES" sz="2400" b="1" dirty="0">
-              <a:solidFill>
-                <a:schemeClr val="accent5">
-                  <a:lumMod val="50000"/>
-                </a:schemeClr>
-              </a:solidFill>
-            </a:endParaRPr>
-          </a:p>
-        </p:txBody>
-      </p:sp>
       <p:pic>
         <p:nvPicPr>
-          <p:cNvPr id="1027" name="Picture 3"/>
+          <p:cNvPr id="1026" name="Picture 2"/>
           <p:cNvPicPr>
             <a:picLocks noChangeAspect="1" noChangeArrowheads="1"/>
           </p:cNvPicPr>
@@ -10844,6 +10991,60 @@
         </p:nvPicPr>
         <p:blipFill>
           <a:blip r:embed="rId2">
+            <a:extLst>
+              <a:ext uri="{28A0092B-C50C-407E-A947-70E740481C1C}">
+                <a14:useLocalDpi xmlns:a14="http://schemas.microsoft.com/office/drawing/2010/main" val="0"/>
+              </a:ext>
+            </a:extLst>
+          </a:blip>
+          <a:srcRect/>
+          <a:stretch>
+            <a:fillRect/>
+          </a:stretch>
+        </p:blipFill>
+        <p:spPr bwMode="auto">
+          <a:xfrm>
+            <a:off x="179511" y="2937015"/>
+            <a:ext cx="8856985" cy="4020377"/>
+          </a:xfrm>
+          <a:prstGeom prst="rect">
+            <a:avLst/>
+          </a:prstGeom>
+          <a:noFill/>
+          <a:ln>
+            <a:noFill/>
+          </a:ln>
+          <a:extLst>
+            <a:ext uri="{909E8E84-426E-40DD-AFC4-6F175D3DCCD1}">
+              <a14:hiddenFill xmlns:a14="http://schemas.microsoft.com/office/drawing/2010/main">
+                <a:solidFill>
+                  <a:schemeClr val="accent1"/>
+                </a:solidFill>
+              </a14:hiddenFill>
+            </a:ext>
+            <a:ext uri="{91240B29-F687-4F45-9708-019B960494DF}">
+              <a14:hiddenLine xmlns:a14="http://schemas.microsoft.com/office/drawing/2010/main" w="9525">
+                <a:solidFill>
+                  <a:schemeClr val="tx1"/>
+                </a:solidFill>
+                <a:miter lim="800000"/>
+                <a:headEnd/>
+                <a:tailEnd/>
+              </a14:hiddenLine>
+            </a:ext>
+          </a:extLst>
+        </p:spPr>
+      </p:pic>
+      <p:pic>
+        <p:nvPicPr>
+          <p:cNvPr id="2" name="Picture 2"/>
+          <p:cNvPicPr>
+            <a:picLocks noChangeAspect="1" noChangeArrowheads="1"/>
+          </p:cNvPicPr>
+          <p:nvPr/>
+        </p:nvPicPr>
+        <p:blipFill>
+          <a:blip r:embed="rId3" cstate="print">
             <a:clrChange>
               <a:clrFrom>
                 <a:srgbClr val="FFFFFF"/>
@@ -10867,8 +11068,8 @@
         </p:blipFill>
         <p:spPr bwMode="auto">
           <a:xfrm>
-            <a:off x="161925" y="2800958"/>
-            <a:ext cx="8874571" cy="3868402"/>
+            <a:off x="5004048" y="-29209"/>
+            <a:ext cx="3600400" cy="2978189"/>
           </a:xfrm>
           <a:prstGeom prst="rect">
             <a:avLst/>
@@ -10898,56 +11099,16 @@
           </a:extLst>
         </p:spPr>
       </p:pic>
-      <p:sp>
-        <p:nvSpPr>
-          <p:cNvPr id="5" name="4 CuadroTexto"/>
-          <p:cNvSpPr txBox="1"/>
-          <p:nvPr/>
-        </p:nvSpPr>
-        <p:spPr>
-          <a:xfrm>
-            <a:off x="179511" y="2420888"/>
-            <a:ext cx="3528393" cy="276999"/>
-          </a:xfrm>
-          <a:prstGeom prst="rect">
-            <a:avLst/>
-          </a:prstGeom>
-          <a:noFill/>
-        </p:spPr>
-        <p:txBody>
-          <a:bodyPr wrap="square" rtlCol="0">
-            <a:spAutoFit/>
-          </a:bodyPr>
-          <a:lstStyle/>
-          <a:p>
-            <a:r>
-              <a:rPr lang="es-ES" sz="1200" i="1" dirty="0" smtClean="0"/>
-              <a:t>Evolución en ausencia de perturbaciones</a:t>
-            </a:r>
-            <a:endParaRPr lang="es-ES" sz="1200" i="1" dirty="0"/>
-          </a:p>
-        </p:txBody>
-      </p:sp>
       <p:pic>
         <p:nvPicPr>
-          <p:cNvPr id="1028" name="Picture 4"/>
+          <p:cNvPr id="3" name="Picture 3"/>
           <p:cNvPicPr>
             <a:picLocks noChangeAspect="1" noChangeArrowheads="1"/>
           </p:cNvPicPr>
           <p:nvPr/>
         </p:nvPicPr>
         <p:blipFill>
-          <a:blip r:embed="rId3">
-            <a:clrChange>
-              <a:clrFrom>
-                <a:srgbClr val="FEFEFE"/>
-              </a:clrFrom>
-              <a:clrTo>
-                <a:srgbClr val="FEFEFE">
-                  <a:alpha val="0"/>
-                </a:srgbClr>
-              </a:clrTo>
-            </a:clrChange>
+          <a:blip r:embed="rId4" cstate="print">
             <a:extLst>
               <a:ext uri="{28A0092B-C50C-407E-A947-70E740481C1C}">
                 <a14:useLocalDpi xmlns:a14="http://schemas.microsoft.com/office/drawing/2010/main" val="0"/>
@@ -10961,62 +11122,8 @@
         </p:blipFill>
         <p:spPr bwMode="auto">
           <a:xfrm>
-            <a:off x="4599210" y="794321"/>
-            <a:ext cx="3676650" cy="1438275"/>
-          </a:xfrm>
-          <a:prstGeom prst="rect">
-            <a:avLst/>
-          </a:prstGeom>
-          <a:noFill/>
-          <a:ln>
-            <a:noFill/>
-          </a:ln>
-          <a:extLst>
-            <a:ext uri="{909E8E84-426E-40DD-AFC4-6F175D3DCCD1}">
-              <a14:hiddenFill xmlns:a14="http://schemas.microsoft.com/office/drawing/2010/main">
-                <a:solidFill>
-                  <a:schemeClr val="accent1"/>
-                </a:solidFill>
-              </a14:hiddenFill>
-            </a:ext>
-            <a:ext uri="{91240B29-F687-4F45-9708-019B960494DF}">
-              <a14:hiddenLine xmlns:a14="http://schemas.microsoft.com/office/drawing/2010/main" w="9525">
-                <a:solidFill>
-                  <a:schemeClr val="tx1"/>
-                </a:solidFill>
-                <a:miter lim="800000"/>
-                <a:headEnd/>
-                <a:tailEnd/>
-              </a14:hiddenLine>
-            </a:ext>
-          </a:extLst>
-        </p:spPr>
-      </p:pic>
-      <p:pic>
-        <p:nvPicPr>
-          <p:cNvPr id="1026" name="Picture 2"/>
-          <p:cNvPicPr>
-            <a:picLocks noChangeAspect="1" noChangeArrowheads="1"/>
-          </p:cNvPicPr>
-          <p:nvPr/>
-        </p:nvPicPr>
-        <p:blipFill>
-          <a:blip r:embed="rId4">
-            <a:extLst>
-              <a:ext uri="{28A0092B-C50C-407E-A947-70E740481C1C}">
-                <a14:useLocalDpi xmlns:a14="http://schemas.microsoft.com/office/drawing/2010/main" val="0"/>
-              </a:ext>
-            </a:extLst>
-          </a:blip>
-          <a:srcRect/>
-          <a:stretch>
-            <a:fillRect/>
-          </a:stretch>
-        </p:blipFill>
-        <p:spPr bwMode="auto">
-          <a:xfrm>
-            <a:off x="143507" y="2769924"/>
-            <a:ext cx="8856985" cy="4020377"/>
+            <a:off x="755576" y="25039"/>
+            <a:ext cx="2911976" cy="2911976"/>
           </a:xfrm>
           <a:prstGeom prst="rect">
             <a:avLst/>
@@ -11085,14 +11192,24 @@
       </p:grpSpPr>
       <p:pic>
         <p:nvPicPr>
-          <p:cNvPr id="1026" name="Picture 2"/>
+          <p:cNvPr id="2" name="Picture 2"/>
           <p:cNvPicPr>
             <a:picLocks noChangeAspect="1" noChangeArrowheads="1"/>
           </p:cNvPicPr>
           <p:nvPr/>
         </p:nvPicPr>
         <p:blipFill>
-          <a:blip r:embed="rId2">
+          <a:blip r:embed="rId2" cstate="print">
+            <a:clrChange>
+              <a:clrFrom>
+                <a:srgbClr val="FFFFFF"/>
+              </a:clrFrom>
+              <a:clrTo>
+                <a:srgbClr val="FFFFFF">
+                  <a:alpha val="0"/>
+                </a:srgbClr>
+              </a:clrTo>
+            </a:clrChange>
             <a:extLst>
               <a:ext uri="{28A0092B-C50C-407E-A947-70E740481C1C}">
                 <a14:useLocalDpi xmlns:a14="http://schemas.microsoft.com/office/drawing/2010/main" val="0"/>
@@ -11106,8 +11223,8 @@
         </p:blipFill>
         <p:spPr bwMode="auto">
           <a:xfrm>
-            <a:off x="695325" y="214313"/>
-            <a:ext cx="7753350" cy="6429375"/>
+            <a:off x="4355976" y="44623"/>
+            <a:ext cx="4788024" cy="3960571"/>
           </a:xfrm>
           <a:prstGeom prst="rect">
             <a:avLst/>
@@ -11137,102 +11254,64 @@
           </a:extLst>
         </p:spPr>
       </p:pic>
-      <p:sp>
-        <p:nvSpPr>
-          <p:cNvPr id="4" name="3 Rectángulo"/>
-          <p:cNvSpPr/>
-          <p:nvPr/>
-        </p:nvSpPr>
-        <p:spPr>
-          <a:xfrm>
-            <a:off x="467544" y="548680"/>
-            <a:ext cx="3600400" cy="720080"/>
+      <p:pic>
+        <p:nvPicPr>
+          <p:cNvPr id="3" name="Picture 3"/>
+          <p:cNvPicPr>
+            <a:picLocks noChangeAspect="1" noChangeArrowheads="1"/>
+          </p:cNvPicPr>
+          <p:nvPr/>
+        </p:nvPicPr>
+        <p:blipFill>
+          <a:blip r:embed="rId3" cstate="print">
+            <a:extLst>
+              <a:ext uri="{28A0092B-C50C-407E-A947-70E740481C1C}">
+                <a14:useLocalDpi xmlns:a14="http://schemas.microsoft.com/office/drawing/2010/main" val="0"/>
+              </a:ext>
+            </a:extLst>
+          </a:blip>
+          <a:srcRect/>
+          <a:stretch>
+            <a:fillRect/>
+          </a:stretch>
+        </p:blipFill>
+        <p:spPr bwMode="auto">
+          <a:xfrm>
+            <a:off x="175185" y="25038"/>
+            <a:ext cx="4180791" cy="4180791"/>
           </a:xfrm>
           <a:prstGeom prst="rect">
             <a:avLst/>
           </a:prstGeom>
           <a:noFill/>
           <a:ln>
-            <a:solidFill>
-              <a:srgbClr val="FF0000"/>
-            </a:solidFill>
+            <a:noFill/>
           </a:ln>
-        </p:spPr>
-        <p:style>
-          <a:lnRef idx="2">
-            <a:schemeClr val="accent1">
-              <a:shade val="50000"/>
-            </a:schemeClr>
-          </a:lnRef>
-          <a:fillRef idx="1">
-            <a:schemeClr val="accent1"/>
-          </a:fillRef>
-          <a:effectRef idx="0">
-            <a:schemeClr val="accent1"/>
-          </a:effectRef>
-          <a:fontRef idx="minor">
-            <a:schemeClr val="lt1"/>
-          </a:fontRef>
-        </p:style>
-        <p:txBody>
-          <a:bodyPr rtlCol="0" anchor="ctr"/>
-          <a:lstStyle/>
-          <a:p>
-            <a:pPr algn="ctr"/>
-            <a:endParaRPr lang="es-ES"/>
-          </a:p>
-        </p:txBody>
-      </p:sp>
-      <p:sp>
-        <p:nvSpPr>
-          <p:cNvPr id="5" name="4 Rectángulo"/>
-          <p:cNvSpPr/>
-          <p:nvPr/>
-        </p:nvSpPr>
-        <p:spPr>
-          <a:xfrm>
-            <a:off x="467544" y="3212976"/>
-            <a:ext cx="8352928" cy="1152128"/>
-          </a:xfrm>
-          <a:prstGeom prst="rect">
-            <a:avLst/>
-          </a:prstGeom>
-          <a:noFill/>
-          <a:ln>
-            <a:solidFill>
-              <a:srgbClr val="FF0000"/>
-            </a:solidFill>
-          </a:ln>
-        </p:spPr>
-        <p:style>
-          <a:lnRef idx="2">
-            <a:schemeClr val="accent1">
-              <a:shade val="50000"/>
-            </a:schemeClr>
-          </a:lnRef>
-          <a:fillRef idx="1">
-            <a:schemeClr val="accent1"/>
-          </a:fillRef>
-          <a:effectRef idx="0">
-            <a:schemeClr val="accent1"/>
-          </a:effectRef>
-          <a:fontRef idx="minor">
-            <a:schemeClr val="lt1"/>
-          </a:fontRef>
-        </p:style>
-        <p:txBody>
-          <a:bodyPr rtlCol="0" anchor="ctr"/>
-          <a:lstStyle/>
-          <a:p>
-            <a:pPr algn="ctr"/>
-            <a:endParaRPr lang="es-ES"/>
-          </a:p>
-        </p:txBody>
-      </p:sp>
+          <a:extLst>
+            <a:ext uri="{909E8E84-426E-40DD-AFC4-6F175D3DCCD1}">
+              <a14:hiddenFill xmlns:a14="http://schemas.microsoft.com/office/drawing/2010/main">
+                <a:solidFill>
+                  <a:schemeClr val="accent1"/>
+                </a:solidFill>
+              </a14:hiddenFill>
+            </a:ext>
+            <a:ext uri="{91240B29-F687-4F45-9708-019B960494DF}">
+              <a14:hiddenLine xmlns:a14="http://schemas.microsoft.com/office/drawing/2010/main" w="9525">
+                <a:solidFill>
+                  <a:schemeClr val="tx1"/>
+                </a:solidFill>
+                <a:miter lim="800000"/>
+                <a:headEnd/>
+                <a:tailEnd/>
+              </a14:hiddenLine>
+            </a:ext>
+          </a:extLst>
+        </p:spPr>
+      </p:pic>
     </p:spTree>
     <p:extLst>
       <p:ext uri="{BB962C8B-B14F-4D97-AF65-F5344CB8AC3E}">
-        <p14:creationId xmlns:p14="http://schemas.microsoft.com/office/powerpoint/2010/main" val="3429960711"/>
+        <p14:creationId xmlns:p14="http://schemas.microsoft.com/office/powerpoint/2010/main" val="2408604712"/>
       </p:ext>
     </p:extLst>
   </p:cSld>
@@ -11266,124 +11345,9 @@
           <a:chExt cx="0" cy="0"/>
         </a:xfrm>
       </p:grpSpPr>
-      <p:sp>
-        <p:nvSpPr>
-          <p:cNvPr id="4" name="3 CuadroTexto"/>
-          <p:cNvSpPr txBox="1"/>
-          <p:nvPr/>
-        </p:nvSpPr>
-        <p:spPr>
-          <a:xfrm>
-            <a:off x="179511" y="332656"/>
-            <a:ext cx="4964731" cy="830997"/>
-          </a:xfrm>
-          <a:prstGeom prst="rect">
-            <a:avLst/>
-          </a:prstGeom>
-          <a:noFill/>
-        </p:spPr>
-        <p:txBody>
-          <a:bodyPr wrap="square" rtlCol="0">
-            <a:spAutoFit/>
-          </a:bodyPr>
-          <a:lstStyle/>
-          <a:p>
-            <a:r>
-              <a:rPr lang="es-ES" sz="2400" b="1" dirty="0" smtClean="0">
-                <a:solidFill>
-                  <a:schemeClr val="accent5">
-                    <a:lumMod val="50000"/>
-                  </a:schemeClr>
-                </a:solidFill>
-              </a:rPr>
-              <a:t>Oscilación </a:t>
-            </a:r>
-            <a:r>
-              <a:rPr lang="es-ES" sz="2400" b="1" dirty="0" smtClean="0">
-                <a:solidFill>
-                  <a:schemeClr val="accent5">
-                    <a:lumMod val="50000"/>
-                  </a:schemeClr>
-                </a:solidFill>
-              </a:rPr>
-              <a:t>binaria </a:t>
-            </a:r>
-            <a:r>
-              <a:rPr lang="es-ES" sz="2400" b="1" dirty="0" smtClean="0">
-                <a:solidFill>
-                  <a:schemeClr val="accent5">
-                    <a:lumMod val="50000"/>
-                  </a:schemeClr>
-                </a:solidFill>
-              </a:rPr>
-              <a:t>de la </a:t>
-            </a:r>
-            <a:r>
-              <a:rPr lang="es-ES" sz="2400" b="1" dirty="0" smtClean="0">
-                <a:solidFill>
-                  <a:schemeClr val="accent5">
-                    <a:lumMod val="50000"/>
-                  </a:schemeClr>
-                </a:solidFill>
-              </a:rPr>
-              <a:t>intensidad de floración</a:t>
-            </a:r>
-            <a:endParaRPr lang="es-ES" sz="2400" b="1" dirty="0">
-              <a:solidFill>
-                <a:schemeClr val="accent5">
-                  <a:lumMod val="50000"/>
-                </a:schemeClr>
-              </a:solidFill>
-            </a:endParaRPr>
-          </a:p>
-        </p:txBody>
-      </p:sp>
-      <p:sp>
-        <p:nvSpPr>
-          <p:cNvPr id="6" name="5 CuadroTexto"/>
-          <p:cNvSpPr txBox="1"/>
-          <p:nvPr/>
-        </p:nvSpPr>
-        <p:spPr>
-          <a:xfrm>
-            <a:off x="6228184" y="6534834"/>
-            <a:ext cx="3168352" cy="646331"/>
-          </a:xfrm>
-          <a:prstGeom prst="rect">
-            <a:avLst/>
-          </a:prstGeom>
-          <a:noFill/>
-        </p:spPr>
-        <p:txBody>
-          <a:bodyPr wrap="square" rtlCol="0">
-            <a:spAutoFit/>
-          </a:bodyPr>
-          <a:lstStyle/>
-          <a:p>
-            <a:pPr algn="ctr"/>
-            <a:r>
-              <a:rPr lang="es-ES" dirty="0" smtClean="0">
-                <a:solidFill>
-                  <a:schemeClr val="tx2">
-                    <a:lumMod val="75000"/>
-                  </a:schemeClr>
-                </a:solidFill>
-              </a:rPr>
-              <a:t>El crecimiento de todo el sistema se retrasa</a:t>
-            </a:r>
-            <a:endParaRPr lang="es-ES" dirty="0">
-              <a:solidFill>
-                <a:schemeClr val="tx2">
-                  <a:lumMod val="75000"/>
-                </a:schemeClr>
-              </a:solidFill>
-            </a:endParaRPr>
-          </a:p>
-        </p:txBody>
-      </p:sp>
       <p:pic>
         <p:nvPicPr>
-          <p:cNvPr id="2051" name="Picture 3"/>
+          <p:cNvPr id="1026" name="Picture 2"/>
           <p:cNvPicPr>
             <a:picLocks noChangeAspect="1" noChangeArrowheads="1"/>
           </p:cNvPicPr>
@@ -11404,8 +11368,8 @@
         </p:blipFill>
         <p:spPr bwMode="auto">
           <a:xfrm>
-            <a:off x="234066" y="2276872"/>
-            <a:ext cx="8909934" cy="3804923"/>
+            <a:off x="695325" y="214313"/>
+            <a:ext cx="7753350" cy="6429375"/>
           </a:xfrm>
           <a:prstGeom prst="rect">
             <a:avLst/>
@@ -11435,64 +11399,102 @@
           </a:extLst>
         </p:spPr>
       </p:pic>
-      <p:pic>
-        <p:nvPicPr>
-          <p:cNvPr id="2052" name="Picture 4"/>
-          <p:cNvPicPr>
-            <a:picLocks noChangeAspect="1" noChangeArrowheads="1"/>
-          </p:cNvPicPr>
-          <p:nvPr/>
-        </p:nvPicPr>
-        <p:blipFill>
-          <a:blip r:embed="rId3">
-            <a:extLst>
-              <a:ext uri="{28A0092B-C50C-407E-A947-70E740481C1C}">
-                <a14:useLocalDpi xmlns:a14="http://schemas.microsoft.com/office/drawing/2010/main" val="0"/>
-              </a:ext>
-            </a:extLst>
-          </a:blip>
-          <a:srcRect/>
-          <a:stretch>
-            <a:fillRect/>
-          </a:stretch>
-        </p:blipFill>
-        <p:spPr bwMode="auto">
-          <a:xfrm>
-            <a:off x="804862" y="1588418"/>
-            <a:ext cx="7534275" cy="495300"/>
+      <p:sp>
+        <p:nvSpPr>
+          <p:cNvPr id="4" name="3 Rectángulo"/>
+          <p:cNvSpPr/>
+          <p:nvPr/>
+        </p:nvSpPr>
+        <p:spPr>
+          <a:xfrm>
+            <a:off x="467544" y="548680"/>
+            <a:ext cx="3600400" cy="720080"/>
           </a:xfrm>
           <a:prstGeom prst="rect">
             <a:avLst/>
           </a:prstGeom>
           <a:noFill/>
           <a:ln>
-            <a:noFill/>
+            <a:solidFill>
+              <a:srgbClr val="FF0000"/>
+            </a:solidFill>
           </a:ln>
-          <a:extLst>
-            <a:ext uri="{909E8E84-426E-40DD-AFC4-6F175D3DCCD1}">
-              <a14:hiddenFill xmlns:a14="http://schemas.microsoft.com/office/drawing/2010/main">
-                <a:solidFill>
-                  <a:schemeClr val="accent1"/>
-                </a:solidFill>
-              </a14:hiddenFill>
-            </a:ext>
-            <a:ext uri="{91240B29-F687-4F45-9708-019B960494DF}">
-              <a14:hiddenLine xmlns:a14="http://schemas.microsoft.com/office/drawing/2010/main" w="9525">
-                <a:solidFill>
-                  <a:schemeClr val="tx1"/>
-                </a:solidFill>
-                <a:miter lim="800000"/>
-                <a:headEnd/>
-                <a:tailEnd/>
-              </a14:hiddenLine>
-            </a:ext>
-          </a:extLst>
-        </p:spPr>
-      </p:pic>
+        </p:spPr>
+        <p:style>
+          <a:lnRef idx="2">
+            <a:schemeClr val="accent1">
+              <a:shade val="50000"/>
+            </a:schemeClr>
+          </a:lnRef>
+          <a:fillRef idx="1">
+            <a:schemeClr val="accent1"/>
+          </a:fillRef>
+          <a:effectRef idx="0">
+            <a:schemeClr val="accent1"/>
+          </a:effectRef>
+          <a:fontRef idx="minor">
+            <a:schemeClr val="lt1"/>
+          </a:fontRef>
+        </p:style>
+        <p:txBody>
+          <a:bodyPr rtlCol="0" anchor="ctr"/>
+          <a:lstStyle/>
+          <a:p>
+            <a:pPr algn="ctr"/>
+            <a:endParaRPr lang="es-ES"/>
+          </a:p>
+        </p:txBody>
+      </p:sp>
+      <p:sp>
+        <p:nvSpPr>
+          <p:cNvPr id="5" name="4 Rectángulo"/>
+          <p:cNvSpPr/>
+          <p:nvPr/>
+        </p:nvSpPr>
+        <p:spPr>
+          <a:xfrm>
+            <a:off x="467544" y="3212976"/>
+            <a:ext cx="8352928" cy="1152128"/>
+          </a:xfrm>
+          <a:prstGeom prst="rect">
+            <a:avLst/>
+          </a:prstGeom>
+          <a:noFill/>
+          <a:ln>
+            <a:solidFill>
+              <a:srgbClr val="FF0000"/>
+            </a:solidFill>
+          </a:ln>
+        </p:spPr>
+        <p:style>
+          <a:lnRef idx="2">
+            <a:schemeClr val="accent1">
+              <a:shade val="50000"/>
+            </a:schemeClr>
+          </a:lnRef>
+          <a:fillRef idx="1">
+            <a:schemeClr val="accent1"/>
+          </a:fillRef>
+          <a:effectRef idx="0">
+            <a:schemeClr val="accent1"/>
+          </a:effectRef>
+          <a:fontRef idx="minor">
+            <a:schemeClr val="lt1"/>
+          </a:fontRef>
+        </p:style>
+        <p:txBody>
+          <a:bodyPr rtlCol="0" anchor="ctr"/>
+          <a:lstStyle/>
+          <a:p>
+            <a:pPr algn="ctr"/>
+            <a:endParaRPr lang="es-ES"/>
+          </a:p>
+        </p:txBody>
+      </p:sp>
     </p:spTree>
     <p:extLst>
       <p:ext uri="{BB962C8B-B14F-4D97-AF65-F5344CB8AC3E}">
-        <p14:creationId xmlns:p14="http://schemas.microsoft.com/office/powerpoint/2010/main" val="2960812161"/>
+        <p14:creationId xmlns:p14="http://schemas.microsoft.com/office/powerpoint/2010/main" val="3429960711"/>
       </p:ext>
     </p:extLst>
   </p:cSld>
@@ -11526,9 +11528,94 @@
           <a:chExt cx="0" cy="0"/>
         </a:xfrm>
       </p:grpSpPr>
+      <p:sp>
+        <p:nvSpPr>
+          <p:cNvPr id="4" name="3 CuadroTexto"/>
+          <p:cNvSpPr txBox="1"/>
+          <p:nvPr/>
+        </p:nvSpPr>
+        <p:spPr>
+          <a:xfrm>
+            <a:off x="179511" y="332656"/>
+            <a:ext cx="4964731" cy="830997"/>
+          </a:xfrm>
+          <a:prstGeom prst="rect">
+            <a:avLst/>
+          </a:prstGeom>
+          <a:noFill/>
+        </p:spPr>
+        <p:txBody>
+          <a:bodyPr wrap="square" rtlCol="0">
+            <a:spAutoFit/>
+          </a:bodyPr>
+          <a:lstStyle/>
+          <a:p>
+            <a:r>
+              <a:rPr lang="es-ES" sz="2400" b="1" dirty="0" smtClean="0">
+                <a:solidFill>
+                  <a:schemeClr val="accent5">
+                    <a:lumMod val="50000"/>
+                  </a:schemeClr>
+                </a:solidFill>
+              </a:rPr>
+              <a:t>Oscilación binaria de la intensidad de floración</a:t>
+            </a:r>
+            <a:endParaRPr lang="es-ES" sz="2400" b="1" dirty="0">
+              <a:solidFill>
+                <a:schemeClr val="accent5">
+                  <a:lumMod val="50000"/>
+                </a:schemeClr>
+              </a:solidFill>
+            </a:endParaRPr>
+          </a:p>
+        </p:txBody>
+      </p:sp>
+      <p:sp>
+        <p:nvSpPr>
+          <p:cNvPr id="6" name="5 CuadroTexto"/>
+          <p:cNvSpPr txBox="1"/>
+          <p:nvPr/>
+        </p:nvSpPr>
+        <p:spPr>
+          <a:xfrm>
+            <a:off x="6228184" y="6534834"/>
+            <a:ext cx="3168352" cy="646331"/>
+          </a:xfrm>
+          <a:prstGeom prst="rect">
+            <a:avLst/>
+          </a:prstGeom>
+          <a:noFill/>
+        </p:spPr>
+        <p:txBody>
+          <a:bodyPr wrap="square" rtlCol="0">
+            <a:spAutoFit/>
+          </a:bodyPr>
+          <a:lstStyle/>
+          <a:p>
+            <a:pPr algn="ctr"/>
+            <a:r>
+              <a:rPr lang="es-ES" dirty="0" smtClean="0">
+                <a:solidFill>
+                  <a:schemeClr val="tx2">
+                    <a:lumMod val="75000"/>
+                  </a:schemeClr>
+                </a:solidFill>
+              </a:rPr>
+              <a:t>El crecimiento de todo el sistema se retrasa</a:t>
+            </a:r>
+            <a:endParaRPr lang="es-ES" dirty="0">
+              <a:solidFill>
+                <a:schemeClr val="tx2">
+                  <a:lumMod val="75000"/>
+                </a:schemeClr>
+              </a:solidFill>
+            </a:endParaRPr>
+          </a:p>
+        </p:txBody>
+      </p:sp>
       <p:pic>
         <p:nvPicPr>
-          <p:cNvPr id="2050" name="Picture 2"/>
+          <p:cNvPr id="2051" name="Picture 3"/>
           <p:cNvPicPr>
             <a:picLocks noChangeAspect="1" noChangeArrowheads="1"/>
           </p:cNvPicPr>
@@ -11549,8 +11636,8 @@
         </p:blipFill>
         <p:spPr bwMode="auto">
           <a:xfrm>
-            <a:off x="695325" y="214313"/>
-            <a:ext cx="7753350" cy="6429375"/>
+            <a:off x="234066" y="2276872"/>
+            <a:ext cx="8909934" cy="3804923"/>
           </a:xfrm>
           <a:prstGeom prst="rect">
             <a:avLst/>
@@ -11580,10 +11667,64 @@
           </a:extLst>
         </p:spPr>
       </p:pic>
+      <p:pic>
+        <p:nvPicPr>
+          <p:cNvPr id="2052" name="Picture 4"/>
+          <p:cNvPicPr>
+            <a:picLocks noChangeAspect="1" noChangeArrowheads="1"/>
+          </p:cNvPicPr>
+          <p:nvPr/>
+        </p:nvPicPr>
+        <p:blipFill>
+          <a:blip r:embed="rId3">
+            <a:extLst>
+              <a:ext uri="{28A0092B-C50C-407E-A947-70E740481C1C}">
+                <a14:useLocalDpi xmlns:a14="http://schemas.microsoft.com/office/drawing/2010/main" val="0"/>
+              </a:ext>
+            </a:extLst>
+          </a:blip>
+          <a:srcRect/>
+          <a:stretch>
+            <a:fillRect/>
+          </a:stretch>
+        </p:blipFill>
+        <p:spPr bwMode="auto">
+          <a:xfrm>
+            <a:off x="804862" y="1588418"/>
+            <a:ext cx="7534275" cy="495300"/>
+          </a:xfrm>
+          <a:prstGeom prst="rect">
+            <a:avLst/>
+          </a:prstGeom>
+          <a:noFill/>
+          <a:ln>
+            <a:noFill/>
+          </a:ln>
+          <a:extLst>
+            <a:ext uri="{909E8E84-426E-40DD-AFC4-6F175D3DCCD1}">
+              <a14:hiddenFill xmlns:a14="http://schemas.microsoft.com/office/drawing/2010/main">
+                <a:solidFill>
+                  <a:schemeClr val="accent1"/>
+                </a:solidFill>
+              </a14:hiddenFill>
+            </a:ext>
+            <a:ext uri="{91240B29-F687-4F45-9708-019B960494DF}">
+              <a14:hiddenLine xmlns:a14="http://schemas.microsoft.com/office/drawing/2010/main" w="9525">
+                <a:solidFill>
+                  <a:schemeClr val="tx1"/>
+                </a:solidFill>
+                <a:miter lim="800000"/>
+                <a:headEnd/>
+                <a:tailEnd/>
+              </a14:hiddenLine>
+            </a:ext>
+          </a:extLst>
+        </p:spPr>
+      </p:pic>
     </p:spTree>
     <p:extLst>
       <p:ext uri="{BB962C8B-B14F-4D97-AF65-F5344CB8AC3E}">
-        <p14:creationId xmlns:p14="http://schemas.microsoft.com/office/powerpoint/2010/main" val="1144641124"/>
+        <p14:creationId xmlns:p14="http://schemas.microsoft.com/office/powerpoint/2010/main" val="2960812161"/>
       </p:ext>
     </p:extLst>
   </p:cSld>
@@ -11617,52 +11758,9 @@
           <a:chExt cx="0" cy="0"/>
         </a:xfrm>
       </p:grpSpPr>
-      <p:sp>
-        <p:nvSpPr>
-          <p:cNvPr id="6" name="5 CuadroTexto"/>
-          <p:cNvSpPr txBox="1"/>
-          <p:nvPr/>
-        </p:nvSpPr>
-        <p:spPr>
-          <a:xfrm>
-            <a:off x="6228184" y="6534834"/>
-            <a:ext cx="3168352" cy="646331"/>
-          </a:xfrm>
-          <a:prstGeom prst="rect">
-            <a:avLst/>
-          </a:prstGeom>
-          <a:noFill/>
-        </p:spPr>
-        <p:txBody>
-          <a:bodyPr wrap="square" rtlCol="0">
-            <a:spAutoFit/>
-          </a:bodyPr>
-          <a:lstStyle/>
-          <a:p>
-            <a:pPr algn="ctr"/>
-            <a:r>
-              <a:rPr lang="es-ES" dirty="0" smtClean="0">
-                <a:solidFill>
-                  <a:schemeClr val="tx2">
-                    <a:lumMod val="75000"/>
-                  </a:schemeClr>
-                </a:solidFill>
-              </a:rPr>
-              <a:t>El crecimiento de todo el sistema se retrasa</a:t>
-            </a:r>
-            <a:endParaRPr lang="es-ES" dirty="0">
-              <a:solidFill>
-                <a:schemeClr val="tx2">
-                  <a:lumMod val="75000"/>
-                </a:schemeClr>
-              </a:solidFill>
-            </a:endParaRPr>
-          </a:p>
-        </p:txBody>
-      </p:sp>
       <p:pic>
         <p:nvPicPr>
-          <p:cNvPr id="3074" name="Picture 2"/>
+          <p:cNvPr id="2050" name="Picture 2"/>
           <p:cNvPicPr>
             <a:picLocks noChangeAspect="1" noChangeArrowheads="1"/>
           </p:cNvPicPr>
@@ -11683,8 +11781,8 @@
         </p:blipFill>
         <p:spPr bwMode="auto">
           <a:xfrm>
-            <a:off x="221582" y="2564904"/>
-            <a:ext cx="8700835" cy="3712245"/>
+            <a:off x="695325" y="214313"/>
+            <a:ext cx="7753350" cy="6429375"/>
           </a:xfrm>
           <a:prstGeom prst="rect">
             <a:avLst/>
@@ -11714,64 +11812,10 @@
           </a:extLst>
         </p:spPr>
       </p:pic>
-      <p:pic>
-        <p:nvPicPr>
-          <p:cNvPr id="3075" name="Picture 3"/>
-          <p:cNvPicPr>
-            <a:picLocks noChangeAspect="1" noChangeArrowheads="1"/>
-          </p:cNvPicPr>
-          <p:nvPr/>
-        </p:nvPicPr>
-        <p:blipFill>
-          <a:blip r:embed="rId3">
-            <a:extLst>
-              <a:ext uri="{28A0092B-C50C-407E-A947-70E740481C1C}">
-                <a14:useLocalDpi xmlns:a14="http://schemas.microsoft.com/office/drawing/2010/main" val="0"/>
-              </a:ext>
-            </a:extLst>
-          </a:blip>
-          <a:srcRect/>
-          <a:stretch>
-            <a:fillRect/>
-          </a:stretch>
-        </p:blipFill>
-        <p:spPr bwMode="auto">
-          <a:xfrm>
-            <a:off x="809624" y="1330580"/>
-            <a:ext cx="7524750" cy="1057275"/>
-          </a:xfrm>
-          <a:prstGeom prst="rect">
-            <a:avLst/>
-          </a:prstGeom>
-          <a:noFill/>
-          <a:ln>
-            <a:noFill/>
-          </a:ln>
-          <a:extLst>
-            <a:ext uri="{909E8E84-426E-40DD-AFC4-6F175D3DCCD1}">
-              <a14:hiddenFill xmlns:a14="http://schemas.microsoft.com/office/drawing/2010/main">
-                <a:solidFill>
-                  <a:schemeClr val="accent1"/>
-                </a:solidFill>
-              </a14:hiddenFill>
-            </a:ext>
-            <a:ext uri="{91240B29-F687-4F45-9708-019B960494DF}">
-              <a14:hiddenLine xmlns:a14="http://schemas.microsoft.com/office/drawing/2010/main" w="9525">
-                <a:solidFill>
-                  <a:schemeClr val="tx1"/>
-                </a:solidFill>
-                <a:miter lim="800000"/>
-                <a:headEnd/>
-                <a:tailEnd/>
-              </a14:hiddenLine>
-            </a:ext>
-          </a:extLst>
-        </p:spPr>
-      </p:pic>
     </p:spTree>
     <p:extLst>
       <p:ext uri="{BB962C8B-B14F-4D97-AF65-F5344CB8AC3E}">
-        <p14:creationId xmlns:p14="http://schemas.microsoft.com/office/powerpoint/2010/main" val="280804745"/>
+        <p14:creationId xmlns:p14="http://schemas.microsoft.com/office/powerpoint/2010/main" val="1144641124"/>
       </p:ext>
     </p:extLst>
   </p:cSld>

</xml_diff>